<commit_message>
fixed platform/genre plots, DAMN YOU PANDAS!
</commit_message>
<xml_diff>
--- a/dataMining.pptx
+++ b/dataMining.pptx
@@ -131,6 +131,10 @@
 </p:presentation>
 </file>
 
+<file path=ppt/revisionInfo.xml><?xml version="1.0" encoding="utf-8"?>
+<p1510:revInfo xmlns:a="http://schemas.openxmlformats.org/drawingml/2006/main" xmlns:r="http://schemas.openxmlformats.org/officeDocument/2006/relationships" xmlns:p1510="http://schemas.microsoft.com/office/powerpoint/2015/10/main"/>
+</file>
+
 <file path=ppt/slideLayouts/slideLayout1.xml><?xml version="1.0" encoding="utf-8"?>
 <p:sldLayout xmlns:a="http://schemas.openxmlformats.org/drawingml/2006/main" xmlns:r="http://schemas.openxmlformats.org/officeDocument/2006/relationships" xmlns:p="http://schemas.openxmlformats.org/presentationml/2006/main" preserve="1" userDrawn="1">
   <p:cSld name="Title Slide">
@@ -284,7 +288,7 @@
           <a:p>
             <a:fld id="{F2CC31B8-D55E-3142-A1F8-FCFE86EBD46B}" type="datetime1">
               <a:rPr lang="en-US" smtClean="0"/>
-              <a:t>05-Dec-17</a:t>
+              <a:t>06-Dec-17</a:t>
             </a:fld>
             <a:endParaRPr lang="en-US" dirty="0"/>
           </a:p>
@@ -492,7 +496,7 @@
           <a:p>
             <a:fld id="{EA0B2E4C-09A0-1C47-AC04-653E7CA38318}" type="datetime1">
               <a:rPr lang="en-US" smtClean="0"/>
-              <a:t>05-Dec-17</a:t>
+              <a:t>06-Dec-17</a:t>
             </a:fld>
             <a:endParaRPr lang="en-US"/>
           </a:p>
@@ -784,7 +788,7 @@
           <a:p>
             <a:fld id="{8BA5FDB6-C8E1-CA43-986D-07A95846BEF8}" type="datetime1">
               <a:rPr lang="en-US" smtClean="0"/>
-              <a:t>05-Dec-17</a:t>
+              <a:t>06-Dec-17</a:t>
             </a:fld>
             <a:endParaRPr lang="en-US" dirty="0"/>
           </a:p>
@@ -1035,7 +1039,7 @@
           <a:p>
             <a:fld id="{D181DAD3-920B-5943-A25F-8EE8A165768D}" type="datetime1">
               <a:rPr lang="en-US" smtClean="0"/>
-              <a:t>05-Dec-17</a:t>
+              <a:t>06-Dec-17</a:t>
             </a:fld>
             <a:endParaRPr lang="en-US"/>
           </a:p>
@@ -1306,7 +1310,7 @@
           <a:p>
             <a:fld id="{E6DFEB03-8AE6-F64E-A2BF-5A3C6EB89D07}" type="datetime1">
               <a:rPr lang="en-US" smtClean="0"/>
-              <a:t>05-Dec-17</a:t>
+              <a:t>06-Dec-17</a:t>
             </a:fld>
             <a:endParaRPr lang="en-US" dirty="0"/>
           </a:p>
@@ -1515,7 +1519,7 @@
           <a:p>
             <a:fld id="{E6DFEB03-8AE6-F64E-A2BF-5A3C6EB89D07}" type="datetime1">
               <a:rPr lang="en-US" smtClean="0"/>
-              <a:t>05-Dec-17</a:t>
+              <a:t>06-Dec-17</a:t>
             </a:fld>
             <a:endParaRPr lang="en-US" dirty="0"/>
           </a:p>
@@ -1624,7 +1628,7 @@
           <a:p>
             <a:fld id="{095AFE96-DCFC-C64E-95A7-05B2CB393A95}" type="datetime1">
               <a:rPr lang="en-US" smtClean="0"/>
-              <a:t>05-Dec-17</a:t>
+              <a:t>06-Dec-17</a:t>
             </a:fld>
             <a:endParaRPr lang="en-US"/>
           </a:p>
@@ -1850,7 +1854,7 @@
             <a:fld id="{C7FD4294-2665-F444-8DA7-9FAAB9092A2E}" type="datetime1">
               <a:rPr lang="en-US" smtClean="0"/>
               <a:pPr/>
-              <a:t>05-Dec-17</a:t>
+              <a:t>06-Dec-17</a:t>
             </a:fld>
             <a:endParaRPr lang="en-US" dirty="0"/>
           </a:p>
@@ -2257,7 +2261,7 @@
           <a:p>
             <a:fld id="{F2CC31B8-D55E-3142-A1F8-FCFE86EBD46B}" type="datetime1">
               <a:rPr lang="en-US" smtClean="0"/>
-              <a:t>05-Dec-17</a:t>
+              <a:t>06-Dec-17</a:t>
             </a:fld>
             <a:endParaRPr lang="en-US" dirty="0"/>
           </a:p>
@@ -2816,7 +2820,7 @@
           <a:p>
             <a:fld id="{EA0B2E4C-09A0-1C47-AC04-653E7CA38318}" type="datetime1">
               <a:rPr lang="en-US" smtClean="0"/>
-              <a:t>05-Dec-17</a:t>
+              <a:t>06-Dec-17</a:t>
             </a:fld>
             <a:endParaRPr lang="en-US"/>
           </a:p>
@@ -3833,98 +3837,12 @@
           <a:chExt cx="0" cy="0"/>
         </a:xfrm>
       </p:grpSpPr>
-      <p:sp>
-        <p:nvSpPr>
-          <p:cNvPr id="2" name="Title 1">
+      <p:pic>
+        <p:nvPicPr>
+          <p:cNvPr id="3" name="Picture 2">
             <a:extLst>
               <a:ext uri="{FF2B5EF4-FFF2-40B4-BE49-F238E27FC236}">
-                <a16:creationId xmlns:a16="http://schemas.microsoft.com/office/drawing/2014/main" id="{D3CAA16F-C77B-4886-A8E9-1DD768A0F1FD}"/>
-              </a:ext>
-            </a:extLst>
-          </p:cNvPr>
-          <p:cNvSpPr>
-            <a:spLocks noGrp="1"/>
-          </p:cNvSpPr>
-          <p:nvPr>
-            <p:ph type="title"/>
-          </p:nvPr>
-        </p:nvSpPr>
-        <p:spPr/>
-        <p:txBody>
-          <a:bodyPr/>
-          <a:lstStyle/>
-          <a:p>
-            <a:r>
-              <a:rPr lang="en-US" dirty="0"/>
-              <a:t>Data Preparation</a:t>
-            </a:r>
-          </a:p>
-        </p:txBody>
-      </p:sp>
-      <p:sp>
-        <p:nvSpPr>
-          <p:cNvPr id="4" name="Date Placeholder 3">
-            <a:extLst>
-              <a:ext uri="{FF2B5EF4-FFF2-40B4-BE49-F238E27FC236}">
-                <a16:creationId xmlns:a16="http://schemas.microsoft.com/office/drawing/2014/main" id="{A201EBB2-82CE-4D2A-893E-853398FB564A}"/>
-              </a:ext>
-            </a:extLst>
-          </p:cNvPr>
-          <p:cNvSpPr>
-            <a:spLocks noGrp="1"/>
-          </p:cNvSpPr>
-          <p:nvPr>
-            <p:ph type="dt" sz="half" idx="10"/>
-          </p:nvPr>
-        </p:nvSpPr>
-        <p:spPr/>
-        <p:txBody>
-          <a:bodyPr/>
-          <a:lstStyle/>
-          <a:p>
-            <a:fld id="{EA0B2E4C-09A0-1C47-AC04-653E7CA38318}" type="datetime1">
-              <a:rPr lang="en-US" smtClean="0"/>
-              <a:t>05-Dec-17</a:t>
-            </a:fld>
-            <a:endParaRPr lang="en-US"/>
-          </a:p>
-        </p:txBody>
-      </p:sp>
-      <p:sp>
-        <p:nvSpPr>
-          <p:cNvPr id="5" name="Footer Placeholder 4">
-            <a:extLst>
-              <a:ext uri="{FF2B5EF4-FFF2-40B4-BE49-F238E27FC236}">
-                <a16:creationId xmlns:a16="http://schemas.microsoft.com/office/drawing/2014/main" id="{4330116C-C09C-4855-8BE1-A63BAEB123F1}"/>
-              </a:ext>
-            </a:extLst>
-          </p:cNvPr>
-          <p:cNvSpPr>
-            <a:spLocks noGrp="1"/>
-          </p:cNvSpPr>
-          <p:nvPr>
-            <p:ph type="ftr" sz="quarter" idx="11"/>
-          </p:nvPr>
-        </p:nvSpPr>
-        <p:spPr/>
-        <p:txBody>
-          <a:bodyPr/>
-          <a:lstStyle/>
-          <a:p>
-            <a:r>
-              <a:rPr lang="pt-BR"/>
-              <a:t>Instituto Superior Técnico </a:t>
-            </a:r>
-            <a:endParaRPr lang="en-US"/>
-          </a:p>
-        </p:txBody>
-      </p:sp>
-      <p:pic>
-        <p:nvPicPr>
-          <p:cNvPr id="7" name="Picture 6">
-            <a:extLst>
-              <a:ext uri="{FF2B5EF4-FFF2-40B4-BE49-F238E27FC236}">
-                <a16:creationId xmlns:a16="http://schemas.microsoft.com/office/drawing/2014/main" id="{94C72909-D97F-48A7-8876-327B69664285}"/>
+                <a16:creationId xmlns:a16="http://schemas.microsoft.com/office/drawing/2014/main" id="{EDBAD5A5-9872-47E0-8F8E-208F5E0FE7BC}"/>
               </a:ext>
             </a:extLst>
           </p:cNvPr>
@@ -3942,13 +3860,99 @@
         <p:spPr>
           <a:xfrm>
             <a:off x="1326307" y="2317703"/>
-            <a:ext cx="6488466" cy="3436326"/>
+            <a:ext cx="6488466" cy="3334030"/>
           </a:xfrm>
           <a:prstGeom prst="rect">
             <a:avLst/>
           </a:prstGeom>
         </p:spPr>
       </p:pic>
+      <p:sp>
+        <p:nvSpPr>
+          <p:cNvPr id="2" name="Title 1">
+            <a:extLst>
+              <a:ext uri="{FF2B5EF4-FFF2-40B4-BE49-F238E27FC236}">
+                <a16:creationId xmlns:a16="http://schemas.microsoft.com/office/drawing/2014/main" id="{D3CAA16F-C77B-4886-A8E9-1DD768A0F1FD}"/>
+              </a:ext>
+            </a:extLst>
+          </p:cNvPr>
+          <p:cNvSpPr>
+            <a:spLocks noGrp="1"/>
+          </p:cNvSpPr>
+          <p:nvPr>
+            <p:ph type="title"/>
+          </p:nvPr>
+        </p:nvSpPr>
+        <p:spPr/>
+        <p:txBody>
+          <a:bodyPr/>
+          <a:lstStyle/>
+          <a:p>
+            <a:r>
+              <a:rPr lang="en-US" dirty="0"/>
+              <a:t>Data Preparation</a:t>
+            </a:r>
+          </a:p>
+        </p:txBody>
+      </p:sp>
+      <p:sp>
+        <p:nvSpPr>
+          <p:cNvPr id="4" name="Date Placeholder 3">
+            <a:extLst>
+              <a:ext uri="{FF2B5EF4-FFF2-40B4-BE49-F238E27FC236}">
+                <a16:creationId xmlns:a16="http://schemas.microsoft.com/office/drawing/2014/main" id="{A201EBB2-82CE-4D2A-893E-853398FB564A}"/>
+              </a:ext>
+            </a:extLst>
+          </p:cNvPr>
+          <p:cNvSpPr>
+            <a:spLocks noGrp="1"/>
+          </p:cNvSpPr>
+          <p:nvPr>
+            <p:ph type="dt" sz="half" idx="10"/>
+          </p:nvPr>
+        </p:nvSpPr>
+        <p:spPr/>
+        <p:txBody>
+          <a:bodyPr/>
+          <a:lstStyle/>
+          <a:p>
+            <a:fld id="{EA0B2E4C-09A0-1C47-AC04-653E7CA38318}" type="datetime1">
+              <a:rPr lang="en-US" smtClean="0"/>
+              <a:t>06-Dec-17</a:t>
+            </a:fld>
+            <a:endParaRPr lang="en-US"/>
+          </a:p>
+        </p:txBody>
+      </p:sp>
+      <p:sp>
+        <p:nvSpPr>
+          <p:cNvPr id="5" name="Footer Placeholder 4">
+            <a:extLst>
+              <a:ext uri="{FF2B5EF4-FFF2-40B4-BE49-F238E27FC236}">
+                <a16:creationId xmlns:a16="http://schemas.microsoft.com/office/drawing/2014/main" id="{4330116C-C09C-4855-8BE1-A63BAEB123F1}"/>
+              </a:ext>
+            </a:extLst>
+          </p:cNvPr>
+          <p:cNvSpPr>
+            <a:spLocks noGrp="1"/>
+          </p:cNvSpPr>
+          <p:nvPr>
+            <p:ph type="ftr" sz="quarter" idx="11"/>
+          </p:nvPr>
+        </p:nvSpPr>
+        <p:spPr/>
+        <p:txBody>
+          <a:bodyPr/>
+          <a:lstStyle/>
+          <a:p>
+            <a:r>
+              <a:rPr lang="pt-BR"/>
+              <a:t>Instituto Superior Técnico </a:t>
+            </a:r>
+            <a:endParaRPr lang="en-US"/>
+          </a:p>
+        </p:txBody>
+      </p:sp>
     </p:spTree>
     <p:extLst>
       <p:ext uri="{BB962C8B-B14F-4D97-AF65-F5344CB8AC3E}">
@@ -4035,7 +4039,7 @@
           <a:p>
             <a:fld id="{EA0B2E4C-09A0-1C47-AC04-653E7CA38318}" type="datetime1">
               <a:rPr lang="en-US" smtClean="0"/>
-              <a:t>05-Dec-17</a:t>
+              <a:t>06-Dec-17</a:t>
             </a:fld>
             <a:endParaRPr lang="en-US"/>
           </a:p>
@@ -4437,7 +4441,7 @@
           <a:p>
             <a:fld id="{EA0B2E4C-09A0-1C47-AC04-653E7CA38318}" type="datetime1">
               <a:rPr lang="en-US" smtClean="0"/>
-              <a:t>05-Dec-17</a:t>
+              <a:t>06-Dec-17</a:t>
             </a:fld>
             <a:endParaRPr lang="en-US"/>
           </a:p>
@@ -4799,7 +4803,7 @@
           <a:p>
             <a:fld id="{EA0B2E4C-09A0-1C47-AC04-653E7CA38318}" type="datetime1">
               <a:rPr lang="en-US" smtClean="0"/>
-              <a:t>05-Dec-17</a:t>
+              <a:t>06-Dec-17</a:t>
             </a:fld>
             <a:endParaRPr lang="en-US"/>
           </a:p>
@@ -4940,7 +4944,7 @@
           <a:p>
             <a:fld id="{EA0B2E4C-09A0-1C47-AC04-653E7CA38318}" type="datetime1">
               <a:rPr lang="en-US" smtClean="0"/>
-              <a:t>05-Dec-17</a:t>
+              <a:t>06-Dec-17</a:t>
             </a:fld>
             <a:endParaRPr lang="en-US"/>
           </a:p>

</xml_diff>

<commit_message>
fixed fraction plots and added salesYear.pdf
</commit_message>
<xml_diff>
--- a/dataMining.pptx
+++ b/dataMining.pptx
@@ -8,12 +8,13 @@
     <p:sldId id="256" r:id="rId2"/>
     <p:sldId id="257" r:id="rId3"/>
     <p:sldId id="258" r:id="rId4"/>
-    <p:sldId id="262" r:id="rId5"/>
-    <p:sldId id="264" r:id="rId6"/>
-    <p:sldId id="263" r:id="rId7"/>
-    <p:sldId id="265" r:id="rId8"/>
-    <p:sldId id="259" r:id="rId9"/>
-    <p:sldId id="260" r:id="rId10"/>
+    <p:sldId id="266" r:id="rId5"/>
+    <p:sldId id="262" r:id="rId6"/>
+    <p:sldId id="264" r:id="rId7"/>
+    <p:sldId id="263" r:id="rId8"/>
+    <p:sldId id="265" r:id="rId9"/>
+    <p:sldId id="259" r:id="rId10"/>
+    <p:sldId id="260" r:id="rId11"/>
   </p:sldIdLst>
   <p:sldSz cx="9144000" cy="6858000" type="screen4x3"/>
   <p:notesSz cx="6858000" cy="9144000"/>
@@ -2696,6 +2697,147 @@
     <p:extLst>
       <p:ext uri="{BB962C8B-B14F-4D97-AF65-F5344CB8AC3E}">
         <p14:creationId xmlns:p14="http://schemas.microsoft.com/office/powerpoint/2010/main" val="3515638798"/>
+      </p:ext>
+    </p:extLst>
+  </p:cSld>
+  <p:clrMapOvr>
+    <a:masterClrMapping/>
+  </p:clrMapOvr>
+</p:sld>
+</file>
+
+<file path=ppt/slides/slide10.xml><?xml version="1.0" encoding="utf-8"?>
+<p:sld xmlns:a="http://schemas.openxmlformats.org/drawingml/2006/main" xmlns:r="http://schemas.openxmlformats.org/officeDocument/2006/relationships" xmlns:p="http://schemas.openxmlformats.org/presentationml/2006/main">
+  <p:cSld>
+    <p:spTree>
+      <p:nvGrpSpPr>
+        <p:cNvPr id="1" name=""/>
+        <p:cNvGrpSpPr/>
+        <p:nvPr/>
+      </p:nvGrpSpPr>
+      <p:grpSpPr>
+        <a:xfrm>
+          <a:off x="0" y="0"/>
+          <a:ext cx="0" cy="0"/>
+          <a:chOff x="0" y="0"/>
+          <a:chExt cx="0" cy="0"/>
+        </a:xfrm>
+      </p:grpSpPr>
+      <p:sp>
+        <p:nvSpPr>
+          <p:cNvPr id="2" name="Title 1">
+            <a:extLst>
+              <a:ext uri="{FF2B5EF4-FFF2-40B4-BE49-F238E27FC236}">
+                <a16:creationId xmlns:a16="http://schemas.microsoft.com/office/drawing/2014/main" id="{8F36FE65-625F-4076-B261-6FDE4372DA51}"/>
+              </a:ext>
+            </a:extLst>
+          </p:cNvPr>
+          <p:cNvSpPr>
+            <a:spLocks noGrp="1"/>
+          </p:cNvSpPr>
+          <p:nvPr>
+            <p:ph type="title"/>
+          </p:nvPr>
+        </p:nvSpPr>
+        <p:spPr/>
+        <p:txBody>
+          <a:bodyPr/>
+          <a:lstStyle/>
+          <a:p>
+            <a:r>
+              <a:rPr lang="en-US" dirty="0"/>
+              <a:t>Unsupervised Learning</a:t>
+            </a:r>
+          </a:p>
+        </p:txBody>
+      </p:sp>
+      <p:sp>
+        <p:nvSpPr>
+          <p:cNvPr id="3" name="Content Placeholder 2">
+            <a:extLst>
+              <a:ext uri="{FF2B5EF4-FFF2-40B4-BE49-F238E27FC236}">
+                <a16:creationId xmlns:a16="http://schemas.microsoft.com/office/drawing/2014/main" id="{F4F316AA-FBB5-4896-BA57-0179F67CD55B}"/>
+              </a:ext>
+            </a:extLst>
+          </p:cNvPr>
+          <p:cNvSpPr>
+            <a:spLocks noGrp="1"/>
+          </p:cNvSpPr>
+          <p:nvPr>
+            <p:ph idx="1"/>
+          </p:nvPr>
+        </p:nvSpPr>
+        <p:spPr/>
+        <p:txBody>
+          <a:bodyPr/>
+          <a:lstStyle/>
+          <a:p>
+            <a:endParaRPr lang="en-US"/>
+          </a:p>
+        </p:txBody>
+      </p:sp>
+      <p:sp>
+        <p:nvSpPr>
+          <p:cNvPr id="4" name="Date Placeholder 3">
+            <a:extLst>
+              <a:ext uri="{FF2B5EF4-FFF2-40B4-BE49-F238E27FC236}">
+                <a16:creationId xmlns:a16="http://schemas.microsoft.com/office/drawing/2014/main" id="{4CD56520-9B30-4C43-8BD2-0A6FC9A05302}"/>
+              </a:ext>
+            </a:extLst>
+          </p:cNvPr>
+          <p:cNvSpPr>
+            <a:spLocks noGrp="1"/>
+          </p:cNvSpPr>
+          <p:nvPr>
+            <p:ph type="dt" sz="half" idx="10"/>
+          </p:nvPr>
+        </p:nvSpPr>
+        <p:spPr/>
+        <p:txBody>
+          <a:bodyPr/>
+          <a:lstStyle/>
+          <a:p>
+            <a:fld id="{EA0B2E4C-09A0-1C47-AC04-653E7CA38318}" type="datetime1">
+              <a:rPr lang="en-US" smtClean="0"/>
+              <a:t>06-Dec-17</a:t>
+            </a:fld>
+            <a:endParaRPr lang="en-US"/>
+          </a:p>
+        </p:txBody>
+      </p:sp>
+      <p:sp>
+        <p:nvSpPr>
+          <p:cNvPr id="5" name="Footer Placeholder 4">
+            <a:extLst>
+              <a:ext uri="{FF2B5EF4-FFF2-40B4-BE49-F238E27FC236}">
+                <a16:creationId xmlns:a16="http://schemas.microsoft.com/office/drawing/2014/main" id="{6ED228B2-06BD-4317-A938-518C41533311}"/>
+              </a:ext>
+            </a:extLst>
+          </p:cNvPr>
+          <p:cNvSpPr>
+            <a:spLocks noGrp="1"/>
+          </p:cNvSpPr>
+          <p:nvPr>
+            <p:ph type="ftr" sz="quarter" idx="11"/>
+          </p:nvPr>
+        </p:nvSpPr>
+        <p:spPr/>
+        <p:txBody>
+          <a:bodyPr/>
+          <a:lstStyle/>
+          <a:p>
+            <a:r>
+              <a:rPr lang="pt-BR"/>
+              <a:t>Instituto Superior Técnico </a:t>
+            </a:r>
+            <a:endParaRPr lang="en-US"/>
+          </a:p>
+        </p:txBody>
+      </p:sp>
+    </p:spTree>
+    <p:extLst>
+      <p:ext uri="{BB962C8B-B14F-4D97-AF65-F5344CB8AC3E}">
+        <p14:creationId xmlns:p14="http://schemas.microsoft.com/office/powerpoint/2010/main" val="3431763064"/>
       </p:ext>
     </p:extLst>
   </p:cSld>
@@ -3859,8 +4001,8 @@
         </p:blipFill>
         <p:spPr>
           <a:xfrm>
-            <a:off x="1326307" y="2317703"/>
-            <a:ext cx="6488466" cy="3334030"/>
+            <a:off x="825646" y="2317703"/>
+            <a:ext cx="7490512" cy="3848921"/>
           </a:xfrm>
           <a:prstGeom prst="rect">
             <a:avLst/>
@@ -4074,6 +4216,192 @@
           </a:p>
         </p:txBody>
       </p:sp>
+      <p:sp>
+        <p:nvSpPr>
+          <p:cNvPr id="6" name="TextBox 5">
+            <a:extLst>
+              <a:ext uri="{FF2B5EF4-FFF2-40B4-BE49-F238E27FC236}">
+                <a16:creationId xmlns:a16="http://schemas.microsoft.com/office/drawing/2014/main" id="{3617BBF4-6C44-4519-8B49-494E4927B7D5}"/>
+              </a:ext>
+            </a:extLst>
+          </p:cNvPr>
+          <p:cNvSpPr txBox="1"/>
+          <p:nvPr/>
+        </p:nvSpPr>
+        <p:spPr>
+          <a:xfrm>
+            <a:off x="3412273" y="1695135"/>
+            <a:ext cx="5140712" cy="369332"/>
+          </a:xfrm>
+          <a:prstGeom prst="rect">
+            <a:avLst/>
+          </a:prstGeom>
+          <a:noFill/>
+        </p:spPr>
+        <p:txBody>
+          <a:bodyPr wrap="square" rtlCol="0">
+            <a:spAutoFit/>
+          </a:bodyPr>
+          <a:lstStyle/>
+          <a:p>
+            <a:r>
+              <a:rPr lang="en-US" dirty="0"/>
+              <a:t>Yearly Sales Distribution</a:t>
+            </a:r>
+          </a:p>
+        </p:txBody>
+      </p:sp>
+      <p:pic>
+        <p:nvPicPr>
+          <p:cNvPr id="8" name="Picture 7">
+            <a:extLst>
+              <a:ext uri="{FF2B5EF4-FFF2-40B4-BE49-F238E27FC236}">
+                <a16:creationId xmlns:a16="http://schemas.microsoft.com/office/drawing/2014/main" id="{948E87A8-CEEF-4772-BB96-CEEE2343A514}"/>
+              </a:ext>
+            </a:extLst>
+          </p:cNvPr>
+          <p:cNvPicPr>
+            <a:picLocks noChangeAspect="1"/>
+          </p:cNvPicPr>
+          <p:nvPr/>
+        </p:nvPicPr>
+        <p:blipFill>
+          <a:blip r:embed="rId2"/>
+          <a:stretch>
+            <a:fillRect/>
+          </a:stretch>
+        </p:blipFill>
+        <p:spPr>
+          <a:xfrm>
+            <a:off x="1326379" y="2133940"/>
+            <a:ext cx="6514636" cy="4280712"/>
+          </a:xfrm>
+          <a:prstGeom prst="rect">
+            <a:avLst/>
+          </a:prstGeom>
+        </p:spPr>
+      </p:pic>
+    </p:spTree>
+    <p:extLst>
+      <p:ext uri="{BB962C8B-B14F-4D97-AF65-F5344CB8AC3E}">
+        <p14:creationId xmlns:p14="http://schemas.microsoft.com/office/powerpoint/2010/main" val="4275334719"/>
+      </p:ext>
+    </p:extLst>
+  </p:cSld>
+  <p:clrMapOvr>
+    <a:masterClrMapping/>
+  </p:clrMapOvr>
+</p:sld>
+</file>
+
+<file path=ppt/slides/slide5.xml><?xml version="1.0" encoding="utf-8"?>
+<p:sld xmlns:a="http://schemas.openxmlformats.org/drawingml/2006/main" xmlns:r="http://schemas.openxmlformats.org/officeDocument/2006/relationships" xmlns:p="http://schemas.openxmlformats.org/presentationml/2006/main">
+  <p:cSld>
+    <p:spTree>
+      <p:nvGrpSpPr>
+        <p:cNvPr id="1" name=""/>
+        <p:cNvGrpSpPr/>
+        <p:nvPr/>
+      </p:nvGrpSpPr>
+      <p:grpSpPr>
+        <a:xfrm>
+          <a:off x="0" y="0"/>
+          <a:ext cx="0" cy="0"/>
+          <a:chOff x="0" y="0"/>
+          <a:chExt cx="0" cy="0"/>
+        </a:xfrm>
+      </p:grpSpPr>
+      <p:sp>
+        <p:nvSpPr>
+          <p:cNvPr id="2" name="Title 1">
+            <a:extLst>
+              <a:ext uri="{FF2B5EF4-FFF2-40B4-BE49-F238E27FC236}">
+                <a16:creationId xmlns:a16="http://schemas.microsoft.com/office/drawing/2014/main" id="{D3CAA16F-C77B-4886-A8E9-1DD768A0F1FD}"/>
+              </a:ext>
+            </a:extLst>
+          </p:cNvPr>
+          <p:cNvSpPr>
+            <a:spLocks noGrp="1"/>
+          </p:cNvSpPr>
+          <p:nvPr>
+            <p:ph type="title"/>
+          </p:nvPr>
+        </p:nvSpPr>
+        <p:spPr>
+          <a:xfrm>
+            <a:off x="743285" y="1449340"/>
+            <a:ext cx="2289848" cy="868363"/>
+          </a:xfrm>
+        </p:spPr>
+        <p:txBody>
+          <a:bodyPr/>
+          <a:lstStyle/>
+          <a:p>
+            <a:r>
+              <a:rPr lang="en-US" dirty="0"/>
+              <a:t>EDA</a:t>
+            </a:r>
+          </a:p>
+        </p:txBody>
+      </p:sp>
+      <p:sp>
+        <p:nvSpPr>
+          <p:cNvPr id="4" name="Date Placeholder 3">
+            <a:extLst>
+              <a:ext uri="{FF2B5EF4-FFF2-40B4-BE49-F238E27FC236}">
+                <a16:creationId xmlns:a16="http://schemas.microsoft.com/office/drawing/2014/main" id="{A201EBB2-82CE-4D2A-893E-853398FB564A}"/>
+              </a:ext>
+            </a:extLst>
+          </p:cNvPr>
+          <p:cNvSpPr>
+            <a:spLocks noGrp="1"/>
+          </p:cNvSpPr>
+          <p:nvPr>
+            <p:ph type="dt" sz="half" idx="10"/>
+          </p:nvPr>
+        </p:nvSpPr>
+        <p:spPr/>
+        <p:txBody>
+          <a:bodyPr/>
+          <a:lstStyle/>
+          <a:p>
+            <a:fld id="{EA0B2E4C-09A0-1C47-AC04-653E7CA38318}" type="datetime1">
+              <a:rPr lang="en-US" smtClean="0"/>
+              <a:t>06-Dec-17</a:t>
+            </a:fld>
+            <a:endParaRPr lang="en-US"/>
+          </a:p>
+        </p:txBody>
+      </p:sp>
+      <p:sp>
+        <p:nvSpPr>
+          <p:cNvPr id="5" name="Footer Placeholder 4">
+            <a:extLst>
+              <a:ext uri="{FF2B5EF4-FFF2-40B4-BE49-F238E27FC236}">
+                <a16:creationId xmlns:a16="http://schemas.microsoft.com/office/drawing/2014/main" id="{4330116C-C09C-4855-8BE1-A63BAEB123F1}"/>
+              </a:ext>
+            </a:extLst>
+          </p:cNvPr>
+          <p:cNvSpPr>
+            <a:spLocks noGrp="1"/>
+          </p:cNvSpPr>
+          <p:nvPr>
+            <p:ph type="ftr" sz="quarter" idx="11"/>
+          </p:nvPr>
+        </p:nvSpPr>
+        <p:spPr/>
+        <p:txBody>
+          <a:bodyPr/>
+          <a:lstStyle/>
+          <a:p>
+            <a:r>
+              <a:rPr lang="pt-BR"/>
+              <a:t>Instituto Superior Técnico </a:t>
+            </a:r>
+            <a:endParaRPr lang="en-US"/>
+          </a:p>
+        </p:txBody>
+      </p:sp>
       <p:pic>
         <p:nvPicPr>
           <p:cNvPr id="3" name="Picture 2">
@@ -4152,7 +4480,7 @@
 </p:sld>
 </file>
 
-<file path=ppt/slides/slide5.xml><?xml version="1.0" encoding="utf-8"?>
+<file path=ppt/slides/slide6.xml><?xml version="1.0" encoding="utf-8"?>
 <p:sld xmlns:a="http://schemas.openxmlformats.org/drawingml/2006/main" xmlns:r="http://schemas.openxmlformats.org/officeDocument/2006/relationships" xmlns:p="http://schemas.openxmlformats.org/presentationml/2006/main">
   <p:cSld>
     <p:spTree>
@@ -4297,10 +4625,10 @@
       </p:sp>
       <p:pic>
         <p:nvPicPr>
-          <p:cNvPr id="9" name="Picture 8">
+          <p:cNvPr id="8" name="Picture 7">
             <a:extLst>
               <a:ext uri="{FF2B5EF4-FFF2-40B4-BE49-F238E27FC236}">
-                <a16:creationId xmlns:a16="http://schemas.microsoft.com/office/drawing/2014/main" id="{67D07DAA-CF39-4ECB-9796-5C53EA5E7F77}"/>
+                <a16:creationId xmlns:a16="http://schemas.microsoft.com/office/drawing/2014/main" id="{550EA2C1-B8DA-4F65-9CC6-517568191845}"/>
               </a:ext>
             </a:extLst>
           </p:cNvPr>
@@ -4317,8 +4645,8 @@
         </p:blipFill>
         <p:spPr>
           <a:xfrm>
-            <a:off x="682747" y="2625948"/>
-            <a:ext cx="7778505" cy="2691594"/>
+            <a:off x="1326378" y="2133940"/>
+            <a:ext cx="6491241" cy="4296361"/>
           </a:xfrm>
           <a:prstGeom prst="rect">
             <a:avLst/>
@@ -4338,7 +4666,7 @@
 </p:sld>
 </file>
 
-<file path=ppt/slides/slide6.xml><?xml version="1.0" encoding="utf-8"?>
+<file path=ppt/slides/slide7.xml><?xml version="1.0" encoding="utf-8"?>
 <p:sld xmlns:a="http://schemas.openxmlformats.org/drawingml/2006/main" xmlns:r="http://schemas.openxmlformats.org/officeDocument/2006/relationships" xmlns:p="http://schemas.openxmlformats.org/presentationml/2006/main">
   <p:cSld>
     <p:spTree>
@@ -4524,192 +4852,6 @@
 </p:sld>
 </file>
 
-<file path=ppt/slides/slide7.xml><?xml version="1.0" encoding="utf-8"?>
-<p:sld xmlns:a="http://schemas.openxmlformats.org/drawingml/2006/main" xmlns:r="http://schemas.openxmlformats.org/officeDocument/2006/relationships" xmlns:p="http://schemas.openxmlformats.org/presentationml/2006/main">
-  <p:cSld>
-    <p:spTree>
-      <p:nvGrpSpPr>
-        <p:cNvPr id="1" name=""/>
-        <p:cNvGrpSpPr/>
-        <p:nvPr/>
-      </p:nvGrpSpPr>
-      <p:grpSpPr>
-        <a:xfrm>
-          <a:off x="0" y="0"/>
-          <a:ext cx="0" cy="0"/>
-          <a:chOff x="0" y="0"/>
-          <a:chExt cx="0" cy="0"/>
-        </a:xfrm>
-      </p:grpSpPr>
-      <p:sp>
-        <p:nvSpPr>
-          <p:cNvPr id="2" name="Title 1">
-            <a:extLst>
-              <a:ext uri="{FF2B5EF4-FFF2-40B4-BE49-F238E27FC236}">
-                <a16:creationId xmlns:a16="http://schemas.microsoft.com/office/drawing/2014/main" id="{D3CAA16F-C77B-4886-A8E9-1DD768A0F1FD}"/>
-              </a:ext>
-            </a:extLst>
-          </p:cNvPr>
-          <p:cNvSpPr>
-            <a:spLocks noGrp="1"/>
-          </p:cNvSpPr>
-          <p:nvPr>
-            <p:ph type="title"/>
-          </p:nvPr>
-        </p:nvSpPr>
-        <p:spPr>
-          <a:xfrm>
-            <a:off x="743285" y="1449340"/>
-            <a:ext cx="2289848" cy="868363"/>
-          </a:xfrm>
-        </p:spPr>
-        <p:txBody>
-          <a:bodyPr/>
-          <a:lstStyle/>
-          <a:p>
-            <a:r>
-              <a:rPr lang="en-US" dirty="0"/>
-              <a:t>EDA</a:t>
-            </a:r>
-          </a:p>
-        </p:txBody>
-      </p:sp>
-      <p:sp>
-        <p:nvSpPr>
-          <p:cNvPr id="4" name="Date Placeholder 3">
-            <a:extLst>
-              <a:ext uri="{FF2B5EF4-FFF2-40B4-BE49-F238E27FC236}">
-                <a16:creationId xmlns:a16="http://schemas.microsoft.com/office/drawing/2014/main" id="{A201EBB2-82CE-4D2A-893E-853398FB564A}"/>
-              </a:ext>
-            </a:extLst>
-          </p:cNvPr>
-          <p:cNvSpPr>
-            <a:spLocks noGrp="1"/>
-          </p:cNvSpPr>
-          <p:nvPr>
-            <p:ph type="dt" sz="half" idx="10"/>
-          </p:nvPr>
-        </p:nvSpPr>
-        <p:spPr/>
-        <p:txBody>
-          <a:bodyPr/>
-          <a:lstStyle/>
-          <a:p>
-            <a:fld id="{EA0B2E4C-09A0-1C47-AC04-653E7CA38318}" type="datetime1">
-              <a:rPr lang="en-US" smtClean="0"/>
-              <a:t>06-Dec-17</a:t>
-            </a:fld>
-            <a:endParaRPr lang="en-US"/>
-          </a:p>
-        </p:txBody>
-      </p:sp>
-      <p:sp>
-        <p:nvSpPr>
-          <p:cNvPr id="5" name="Footer Placeholder 4">
-            <a:extLst>
-              <a:ext uri="{FF2B5EF4-FFF2-40B4-BE49-F238E27FC236}">
-                <a16:creationId xmlns:a16="http://schemas.microsoft.com/office/drawing/2014/main" id="{4330116C-C09C-4855-8BE1-A63BAEB123F1}"/>
-              </a:ext>
-            </a:extLst>
-          </p:cNvPr>
-          <p:cNvSpPr>
-            <a:spLocks noGrp="1"/>
-          </p:cNvSpPr>
-          <p:nvPr>
-            <p:ph type="ftr" sz="quarter" idx="11"/>
-          </p:nvPr>
-        </p:nvSpPr>
-        <p:spPr/>
-        <p:txBody>
-          <a:bodyPr/>
-          <a:lstStyle/>
-          <a:p>
-            <a:r>
-              <a:rPr lang="pt-BR"/>
-              <a:t>Instituto Superior Técnico </a:t>
-            </a:r>
-            <a:endParaRPr lang="en-US"/>
-          </a:p>
-        </p:txBody>
-      </p:sp>
-      <p:sp>
-        <p:nvSpPr>
-          <p:cNvPr id="6" name="TextBox 5">
-            <a:extLst>
-              <a:ext uri="{FF2B5EF4-FFF2-40B4-BE49-F238E27FC236}">
-                <a16:creationId xmlns:a16="http://schemas.microsoft.com/office/drawing/2014/main" id="{3617BBF4-6C44-4519-8B49-494E4927B7D5}"/>
-              </a:ext>
-            </a:extLst>
-          </p:cNvPr>
-          <p:cNvSpPr txBox="1"/>
-          <p:nvPr/>
-        </p:nvSpPr>
-        <p:spPr>
-          <a:xfrm>
-            <a:off x="3412273" y="1695135"/>
-            <a:ext cx="5140712" cy="369332"/>
-          </a:xfrm>
-          <a:prstGeom prst="rect">
-            <a:avLst/>
-          </a:prstGeom>
-          <a:noFill/>
-        </p:spPr>
-        <p:txBody>
-          <a:bodyPr wrap="square" rtlCol="0">
-            <a:spAutoFit/>
-          </a:bodyPr>
-          <a:lstStyle/>
-          <a:p>
-            <a:r>
-              <a:rPr lang="en-US" dirty="0"/>
-              <a:t>Genre Distribution</a:t>
-            </a:r>
-          </a:p>
-        </p:txBody>
-      </p:sp>
-      <p:pic>
-        <p:nvPicPr>
-          <p:cNvPr id="8" name="Picture 7">
-            <a:extLst>
-              <a:ext uri="{FF2B5EF4-FFF2-40B4-BE49-F238E27FC236}">
-                <a16:creationId xmlns:a16="http://schemas.microsoft.com/office/drawing/2014/main" id="{D1CD3D02-17C0-4978-9E46-FA15FCF93DF3}"/>
-              </a:ext>
-            </a:extLst>
-          </p:cNvPr>
-          <p:cNvPicPr>
-            <a:picLocks noChangeAspect="1"/>
-          </p:cNvPicPr>
-          <p:nvPr/>
-        </p:nvPicPr>
-        <p:blipFill>
-          <a:blip r:embed="rId2"/>
-          <a:stretch>
-            <a:fillRect/>
-          </a:stretch>
-        </p:blipFill>
-        <p:spPr>
-          <a:xfrm>
-            <a:off x="682747" y="2625949"/>
-            <a:ext cx="7769877" cy="2710656"/>
-          </a:xfrm>
-          <a:prstGeom prst="rect">
-            <a:avLst/>
-          </a:prstGeom>
-        </p:spPr>
-      </p:pic>
-    </p:spTree>
-    <p:extLst>
-      <p:ext uri="{BB962C8B-B14F-4D97-AF65-F5344CB8AC3E}">
-        <p14:creationId xmlns:p14="http://schemas.microsoft.com/office/powerpoint/2010/main" val="2331167531"/>
-      </p:ext>
-    </p:extLst>
-  </p:cSld>
-  <p:clrMapOvr>
-    <a:masterClrMapping/>
-  </p:clrMapOvr>
-</p:sld>
-</file>
-
 <file path=ppt/slides/slide8.xml><?xml version="1.0" encoding="utf-8"?>
 <p:sld xmlns:a="http://schemas.openxmlformats.org/drawingml/2006/main" xmlns:r="http://schemas.openxmlformats.org/officeDocument/2006/relationships" xmlns:p="http://schemas.openxmlformats.org/presentationml/2006/main">
   <p:cSld>
@@ -4732,7 +4874,7 @@
           <p:cNvPr id="2" name="Title 1">
             <a:extLst>
               <a:ext uri="{FF2B5EF4-FFF2-40B4-BE49-F238E27FC236}">
-                <a16:creationId xmlns:a16="http://schemas.microsoft.com/office/drawing/2014/main" id="{EB2DE183-A5D1-446C-93CD-6FBBFD47C4A0}"/>
+                <a16:creationId xmlns:a16="http://schemas.microsoft.com/office/drawing/2014/main" id="{D3CAA16F-C77B-4886-A8E9-1DD768A0F1FD}"/>
               </a:ext>
             </a:extLst>
           </p:cNvPr>
@@ -4743,40 +4885,20 @@
             <p:ph type="title"/>
           </p:nvPr>
         </p:nvSpPr>
-        <p:spPr/>
+        <p:spPr>
+          <a:xfrm>
+            <a:off x="743285" y="1449340"/>
+            <a:ext cx="2289848" cy="868363"/>
+          </a:xfrm>
+        </p:spPr>
         <p:txBody>
           <a:bodyPr/>
           <a:lstStyle/>
           <a:p>
             <a:r>
               <a:rPr lang="en-US" dirty="0"/>
-              <a:t>Platform Classification</a:t>
-            </a:r>
-          </a:p>
-        </p:txBody>
-      </p:sp>
-      <p:sp>
-        <p:nvSpPr>
-          <p:cNvPr id="3" name="Content Placeholder 2">
-            <a:extLst>
-              <a:ext uri="{FF2B5EF4-FFF2-40B4-BE49-F238E27FC236}">
-                <a16:creationId xmlns:a16="http://schemas.microsoft.com/office/drawing/2014/main" id="{53044590-031B-438E-ADCB-66CD6AD356F1}"/>
-              </a:ext>
-            </a:extLst>
-          </p:cNvPr>
-          <p:cNvSpPr>
-            <a:spLocks noGrp="1"/>
-          </p:cNvSpPr>
-          <p:nvPr>
-            <p:ph idx="1"/>
-          </p:nvPr>
-        </p:nvSpPr>
-        <p:spPr/>
-        <p:txBody>
-          <a:bodyPr/>
-          <a:lstStyle/>
-          <a:p>
-            <a:endParaRPr lang="en-US"/>
+              <a:t>EDA</a:t>
+            </a:r>
           </a:p>
         </p:txBody>
       </p:sp>
@@ -4785,7 +4907,7 @@
           <p:cNvPr id="4" name="Date Placeholder 3">
             <a:extLst>
               <a:ext uri="{FF2B5EF4-FFF2-40B4-BE49-F238E27FC236}">
-                <a16:creationId xmlns:a16="http://schemas.microsoft.com/office/drawing/2014/main" id="{3A58F7D9-C22C-43D3-8E0A-70B15B0862B4}"/>
+                <a16:creationId xmlns:a16="http://schemas.microsoft.com/office/drawing/2014/main" id="{A201EBB2-82CE-4D2A-893E-853398FB564A}"/>
               </a:ext>
             </a:extLst>
           </p:cNvPr>
@@ -4814,7 +4936,7 @@
           <p:cNvPr id="5" name="Footer Placeholder 4">
             <a:extLst>
               <a:ext uri="{FF2B5EF4-FFF2-40B4-BE49-F238E27FC236}">
-                <a16:creationId xmlns:a16="http://schemas.microsoft.com/office/drawing/2014/main" id="{B034D441-E3FA-41BA-9C6B-52FE04166311}"/>
+                <a16:creationId xmlns:a16="http://schemas.microsoft.com/office/drawing/2014/main" id="{4330116C-C09C-4855-8BE1-A63BAEB123F1}"/>
               </a:ext>
             </a:extLst>
           </p:cNvPr>
@@ -4838,10 +4960,75 @@
           </a:p>
         </p:txBody>
       </p:sp>
+      <p:sp>
+        <p:nvSpPr>
+          <p:cNvPr id="6" name="TextBox 5">
+            <a:extLst>
+              <a:ext uri="{FF2B5EF4-FFF2-40B4-BE49-F238E27FC236}">
+                <a16:creationId xmlns:a16="http://schemas.microsoft.com/office/drawing/2014/main" id="{3617BBF4-6C44-4519-8B49-494E4927B7D5}"/>
+              </a:ext>
+            </a:extLst>
+          </p:cNvPr>
+          <p:cNvSpPr txBox="1"/>
+          <p:nvPr/>
+        </p:nvSpPr>
+        <p:spPr>
+          <a:xfrm>
+            <a:off x="3412273" y="1695135"/>
+            <a:ext cx="5140712" cy="369332"/>
+          </a:xfrm>
+          <a:prstGeom prst="rect">
+            <a:avLst/>
+          </a:prstGeom>
+          <a:noFill/>
+        </p:spPr>
+        <p:txBody>
+          <a:bodyPr wrap="square" rtlCol="0">
+            <a:spAutoFit/>
+          </a:bodyPr>
+          <a:lstStyle/>
+          <a:p>
+            <a:r>
+              <a:rPr lang="en-US" dirty="0"/>
+              <a:t>Genre Distribution</a:t>
+            </a:r>
+          </a:p>
+        </p:txBody>
+      </p:sp>
+      <p:pic>
+        <p:nvPicPr>
+          <p:cNvPr id="7" name="Picture 6">
+            <a:extLst>
+              <a:ext uri="{FF2B5EF4-FFF2-40B4-BE49-F238E27FC236}">
+                <a16:creationId xmlns:a16="http://schemas.microsoft.com/office/drawing/2014/main" id="{8DDF69F9-F577-4A37-8B21-CCDFF18CD6AA}"/>
+              </a:ext>
+            </a:extLst>
+          </p:cNvPr>
+          <p:cNvPicPr>
+            <a:picLocks noChangeAspect="1"/>
+          </p:cNvPicPr>
+          <p:nvPr/>
+        </p:nvPicPr>
+        <p:blipFill>
+          <a:blip r:embed="rId2"/>
+          <a:stretch>
+            <a:fillRect/>
+          </a:stretch>
+        </p:blipFill>
+        <p:spPr>
+          <a:xfrm>
+            <a:off x="1326379" y="2133941"/>
+            <a:ext cx="6491242" cy="4280711"/>
+          </a:xfrm>
+          <a:prstGeom prst="rect">
+            <a:avLst/>
+          </a:prstGeom>
+        </p:spPr>
+      </p:pic>
     </p:spTree>
     <p:extLst>
       <p:ext uri="{BB962C8B-B14F-4D97-AF65-F5344CB8AC3E}">
-        <p14:creationId xmlns:p14="http://schemas.microsoft.com/office/powerpoint/2010/main" val="585645261"/>
+        <p14:creationId xmlns:p14="http://schemas.microsoft.com/office/powerpoint/2010/main" val="2331167531"/>
       </p:ext>
     </p:extLst>
   </p:cSld>
@@ -4873,7 +5060,7 @@
           <p:cNvPr id="2" name="Title 1">
             <a:extLst>
               <a:ext uri="{FF2B5EF4-FFF2-40B4-BE49-F238E27FC236}">
-                <a16:creationId xmlns:a16="http://schemas.microsoft.com/office/drawing/2014/main" id="{8F36FE65-625F-4076-B261-6FDE4372DA51}"/>
+                <a16:creationId xmlns:a16="http://schemas.microsoft.com/office/drawing/2014/main" id="{EB2DE183-A5D1-446C-93CD-6FBBFD47C4A0}"/>
               </a:ext>
             </a:extLst>
           </p:cNvPr>
@@ -4891,7 +5078,7 @@
           <a:p>
             <a:r>
               <a:rPr lang="en-US" dirty="0"/>
-              <a:t>Unsupervised Learning</a:t>
+              <a:t>Platform Classification</a:t>
             </a:r>
           </a:p>
         </p:txBody>
@@ -4901,7 +5088,7 @@
           <p:cNvPr id="3" name="Content Placeholder 2">
             <a:extLst>
               <a:ext uri="{FF2B5EF4-FFF2-40B4-BE49-F238E27FC236}">
-                <a16:creationId xmlns:a16="http://schemas.microsoft.com/office/drawing/2014/main" id="{F4F316AA-FBB5-4896-BA57-0179F67CD55B}"/>
+                <a16:creationId xmlns:a16="http://schemas.microsoft.com/office/drawing/2014/main" id="{53044590-031B-438E-ADCB-66CD6AD356F1}"/>
               </a:ext>
             </a:extLst>
           </p:cNvPr>
@@ -4926,7 +5113,7 @@
           <p:cNvPr id="4" name="Date Placeholder 3">
             <a:extLst>
               <a:ext uri="{FF2B5EF4-FFF2-40B4-BE49-F238E27FC236}">
-                <a16:creationId xmlns:a16="http://schemas.microsoft.com/office/drawing/2014/main" id="{4CD56520-9B30-4C43-8BD2-0A6FC9A05302}"/>
+                <a16:creationId xmlns:a16="http://schemas.microsoft.com/office/drawing/2014/main" id="{3A58F7D9-C22C-43D3-8E0A-70B15B0862B4}"/>
               </a:ext>
             </a:extLst>
           </p:cNvPr>
@@ -4955,7 +5142,7 @@
           <p:cNvPr id="5" name="Footer Placeholder 4">
             <a:extLst>
               <a:ext uri="{FF2B5EF4-FFF2-40B4-BE49-F238E27FC236}">
-                <a16:creationId xmlns:a16="http://schemas.microsoft.com/office/drawing/2014/main" id="{6ED228B2-06BD-4317-A938-518C41533311}"/>
+                <a16:creationId xmlns:a16="http://schemas.microsoft.com/office/drawing/2014/main" id="{B034D441-E3FA-41BA-9C6B-52FE04166311}"/>
               </a:ext>
             </a:extLst>
           </p:cNvPr>
@@ -4982,7 +5169,7 @@
     </p:spTree>
     <p:extLst>
       <p:ext uri="{BB962C8B-B14F-4D97-AF65-F5344CB8AC3E}">
-        <p14:creationId xmlns:p14="http://schemas.microsoft.com/office/powerpoint/2010/main" val="3431763064"/>
+        <p14:creationId xmlns:p14="http://schemas.microsoft.com/office/powerpoint/2010/main" val="585645261"/>
       </p:ext>
     </p:extLst>
   </p:cSld>

</xml_diff>

<commit_message>
correlation matrix + stuff on the presentation
</commit_message>
<xml_diff>
--- a/dataMining.pptx
+++ b/dataMining.pptx
@@ -8,13 +8,14 @@
     <p:sldId id="256" r:id="rId2"/>
     <p:sldId id="257" r:id="rId3"/>
     <p:sldId id="258" r:id="rId4"/>
-    <p:sldId id="266" r:id="rId5"/>
-    <p:sldId id="262" r:id="rId6"/>
-    <p:sldId id="264" r:id="rId7"/>
-    <p:sldId id="263" r:id="rId8"/>
-    <p:sldId id="265" r:id="rId9"/>
-    <p:sldId id="259" r:id="rId10"/>
-    <p:sldId id="260" r:id="rId11"/>
+    <p:sldId id="267" r:id="rId5"/>
+    <p:sldId id="266" r:id="rId6"/>
+    <p:sldId id="262" r:id="rId7"/>
+    <p:sldId id="264" r:id="rId8"/>
+    <p:sldId id="263" r:id="rId9"/>
+    <p:sldId id="265" r:id="rId10"/>
+    <p:sldId id="259" r:id="rId11"/>
+    <p:sldId id="260" r:id="rId12"/>
   </p:sldIdLst>
   <p:sldSz cx="9144000" cy="6858000" type="screen4x3"/>
   <p:notesSz cx="6858000" cy="9144000"/>
@@ -289,7 +290,7 @@
           <a:p>
             <a:fld id="{F2CC31B8-D55E-3142-A1F8-FCFE86EBD46B}" type="datetime1">
               <a:rPr lang="en-US" smtClean="0"/>
-              <a:t>06-Dec-17</a:t>
+              <a:t>07-Dec-17</a:t>
             </a:fld>
             <a:endParaRPr lang="en-US" dirty="0"/>
           </a:p>
@@ -415,27 +416,88 @@
             <p:ph type="title"/>
           </p:nvPr>
         </p:nvSpPr>
+        <p:spPr>
+          <a:xfrm>
+            <a:off x="2192181" y="136525"/>
+            <a:ext cx="7655237" cy="868363"/>
+          </a:xfrm>
+        </p:spPr>
+        <p:txBody>
+          <a:bodyPr/>
+          <a:lstStyle>
+            <a:lvl1pPr algn="ctr">
+              <a:defRPr/>
+            </a:lvl1pPr>
+          </a:lstStyle>
+          <a:p>
+            <a:r>
+              <a:rPr lang="pt-PT" dirty="0"/>
+              <a:t>Click to edit Master title style</a:t>
+            </a:r>
+            <a:endParaRPr lang="en-US" dirty="0"/>
+          </a:p>
+        </p:txBody>
+      </p:sp>
+      <p:sp>
+        <p:nvSpPr>
+          <p:cNvPr id="3" name="Content Placeholder 2"/>
+          <p:cNvSpPr>
+            <a:spLocks noGrp="1"/>
+          </p:cNvSpPr>
+          <p:nvPr>
+            <p:ph idx="1"/>
+          </p:nvPr>
+        </p:nvSpPr>
         <p:spPr/>
         <p:txBody>
           <a:bodyPr/>
           <a:lstStyle/>
           <a:p>
+            <a:pPr lvl="0"/>
             <a:r>
               <a:rPr lang="pt-PT"/>
-              <a:t>Click to edit Master title style</a:t>
-            </a:r>
-            <a:endParaRPr lang="en-US"/>
-          </a:p>
-        </p:txBody>
-      </p:sp>
-      <p:sp>
-        <p:nvSpPr>
-          <p:cNvPr id="3" name="Content Placeholder 2"/>
-          <p:cNvSpPr>
-            <a:spLocks noGrp="1"/>
-          </p:cNvSpPr>
-          <p:nvPr>
-            <p:ph idx="1"/>
+              <a:t>Click to edit Master text styles</a:t>
+            </a:r>
+          </a:p>
+          <a:p>
+            <a:pPr lvl="1"/>
+            <a:r>
+              <a:rPr lang="pt-PT"/>
+              <a:t>Second level</a:t>
+            </a:r>
+          </a:p>
+          <a:p>
+            <a:pPr lvl="2"/>
+            <a:r>
+              <a:rPr lang="pt-PT"/>
+              <a:t>Third level</a:t>
+            </a:r>
+          </a:p>
+          <a:p>
+            <a:pPr lvl="3"/>
+            <a:r>
+              <a:rPr lang="pt-PT"/>
+              <a:t>Fourth level</a:t>
+            </a:r>
+          </a:p>
+          <a:p>
+            <a:pPr lvl="4"/>
+            <a:r>
+              <a:rPr lang="pt-PT"/>
+              <a:t>Fifth level</a:t>
+            </a:r>
+            <a:endParaRPr lang="en-US" dirty="0"/>
+          </a:p>
+        </p:txBody>
+      </p:sp>
+      <p:sp>
+        <p:nvSpPr>
+          <p:cNvPr id="4" name="Date Placeholder 3"/>
+          <p:cNvSpPr>
+            <a:spLocks noGrp="1"/>
+          </p:cNvSpPr>
+          <p:nvPr>
+            <p:ph type="dt" sz="half" idx="10"/>
           </p:nvPr>
         </p:nvSpPr>
         <p:spPr/>
@@ -443,61 +505,9 @@
           <a:bodyPr/>
           <a:lstStyle/>
           <a:p>
-            <a:pPr lvl="0"/>
-            <a:r>
-              <a:rPr lang="pt-PT"/>
-              <a:t>Click to edit Master text styles</a:t>
-            </a:r>
-          </a:p>
-          <a:p>
-            <a:pPr lvl="1"/>
-            <a:r>
-              <a:rPr lang="pt-PT"/>
-              <a:t>Second level</a:t>
-            </a:r>
-          </a:p>
-          <a:p>
-            <a:pPr lvl="2"/>
-            <a:r>
-              <a:rPr lang="pt-PT"/>
-              <a:t>Third level</a:t>
-            </a:r>
-          </a:p>
-          <a:p>
-            <a:pPr lvl="3"/>
-            <a:r>
-              <a:rPr lang="pt-PT"/>
-              <a:t>Fourth level</a:t>
-            </a:r>
-          </a:p>
-          <a:p>
-            <a:pPr lvl="4"/>
-            <a:r>
-              <a:rPr lang="pt-PT"/>
-              <a:t>Fifth level</a:t>
-            </a:r>
-            <a:endParaRPr lang="en-US" dirty="0"/>
-          </a:p>
-        </p:txBody>
-      </p:sp>
-      <p:sp>
-        <p:nvSpPr>
-          <p:cNvPr id="4" name="Date Placeholder 3"/>
-          <p:cNvSpPr>
-            <a:spLocks noGrp="1"/>
-          </p:cNvSpPr>
-          <p:nvPr>
-            <p:ph type="dt" sz="half" idx="10"/>
-          </p:nvPr>
-        </p:nvSpPr>
-        <p:spPr/>
-        <p:txBody>
-          <a:bodyPr/>
-          <a:lstStyle/>
-          <a:p>
             <a:fld id="{EA0B2E4C-09A0-1C47-AC04-653E7CA38318}" type="datetime1">
               <a:rPr lang="en-US" smtClean="0"/>
-              <a:t>06-Dec-17</a:t>
+              <a:t>07-Dec-17</a:t>
             </a:fld>
             <a:endParaRPr lang="en-US"/>
           </a:p>
@@ -589,10 +599,19 @@
             <p:ph type="title"/>
           </p:nvPr>
         </p:nvSpPr>
-        <p:spPr/>
+        <p:spPr>
+          <a:xfrm>
+            <a:off x="2192181" y="136525"/>
+            <a:ext cx="7655237" cy="868363"/>
+          </a:xfrm>
+        </p:spPr>
         <p:txBody>
           <a:bodyPr/>
-          <a:lstStyle/>
+          <a:lstStyle>
+            <a:lvl1pPr algn="ctr">
+              <a:defRPr/>
+            </a:lvl1pPr>
+          </a:lstStyle>
           <a:p>
             <a:r>
               <a:rPr lang="pt-PT"/>
@@ -789,7 +808,7 @@
           <a:p>
             <a:fld id="{8BA5FDB6-C8E1-CA43-986D-07A95846BEF8}" type="datetime1">
               <a:rPr lang="en-US" smtClean="0"/>
-              <a:t>06-Dec-17</a:t>
+              <a:t>07-Dec-17</a:t>
             </a:fld>
             <a:endParaRPr lang="en-US" dirty="0"/>
           </a:p>
@@ -1040,7 +1059,7 @@
           <a:p>
             <a:fld id="{D181DAD3-920B-5943-A25F-8EE8A165768D}" type="datetime1">
               <a:rPr lang="en-US" smtClean="0"/>
-              <a:t>06-Dec-17</a:t>
+              <a:t>07-Dec-17</a:t>
             </a:fld>
             <a:endParaRPr lang="en-US"/>
           </a:p>
@@ -1104,13 +1123,17 @@
         </p:nvSpPr>
         <p:spPr>
           <a:xfrm>
-            <a:off x="743284" y="1449340"/>
+            <a:off x="2739031" y="136525"/>
             <a:ext cx="7655238" cy="868363"/>
           </a:xfrm>
         </p:spPr>
         <p:txBody>
           <a:bodyPr/>
-          <a:lstStyle/>
+          <a:lstStyle>
+            <a:lvl1pPr algn="ctr">
+              <a:defRPr/>
+            </a:lvl1pPr>
+          </a:lstStyle>
           <a:p>
             <a:r>
               <a:rPr lang="pt-PT"/>
@@ -1311,7 +1334,7 @@
           <a:p>
             <a:fld id="{E6DFEB03-8AE6-F64E-A2BF-5A3C6EB89D07}" type="datetime1">
               <a:rPr lang="en-US" smtClean="0"/>
-              <a:t>06-Dec-17</a:t>
+              <a:t>07-Dec-17</a:t>
             </a:fld>
             <a:endParaRPr lang="en-US" dirty="0"/>
           </a:p>
@@ -1482,13 +1505,17 @@
         </p:nvSpPr>
         <p:spPr>
           <a:xfrm>
-            <a:off x="743284" y="1449340"/>
+            <a:off x="2739031" y="136525"/>
             <a:ext cx="7655238" cy="868363"/>
           </a:xfrm>
         </p:spPr>
         <p:txBody>
           <a:bodyPr/>
-          <a:lstStyle/>
+          <a:lstStyle>
+            <a:lvl1pPr algn="ctr">
+              <a:defRPr/>
+            </a:lvl1pPr>
+          </a:lstStyle>
           <a:p>
             <a:r>
               <a:rPr lang="pt-PT"/>
@@ -1520,7 +1547,7 @@
           <a:p>
             <a:fld id="{E6DFEB03-8AE6-F64E-A2BF-5A3C6EB89D07}" type="datetime1">
               <a:rPr lang="en-US" smtClean="0"/>
-              <a:t>06-Dec-17</a:t>
+              <a:t>07-Dec-17</a:t>
             </a:fld>
             <a:endParaRPr lang="en-US" dirty="0"/>
           </a:p>
@@ -1629,7 +1656,7 @@
           <a:p>
             <a:fld id="{095AFE96-DCFC-C64E-95A7-05B2CB393A95}" type="datetime1">
               <a:rPr lang="en-US" smtClean="0"/>
-              <a:t>06-Dec-17</a:t>
+              <a:t>07-Dec-17</a:t>
             </a:fld>
             <a:endParaRPr lang="en-US"/>
           </a:p>
@@ -1735,7 +1762,7 @@
         </p:nvSpPr>
         <p:spPr>
           <a:xfrm>
-            <a:off x="743284" y="1449340"/>
+            <a:off x="743283" y="141529"/>
             <a:ext cx="7655237" cy="868363"/>
           </a:xfrm>
           <a:prstGeom prst="rect">
@@ -1855,7 +1882,7 @@
             <a:fld id="{C7FD4294-2665-F444-8DA7-9FAAB9092A2E}" type="datetime1">
               <a:rPr lang="en-US" smtClean="0"/>
               <a:pPr/>
-              <a:t>06-Dec-17</a:t>
+              <a:t>07-Dec-17</a:t>
             </a:fld>
             <a:endParaRPr lang="en-US" dirty="0"/>
           </a:p>
@@ -1977,7 +2004,7 @@
   <p:hf sldNum="0" hdr="0"/>
   <p:txStyles>
     <p:titleStyle>
-      <a:lvl1pPr algn="l" defTabSz="457200" rtl="0" eaLnBrk="1" latinLnBrk="0" hangingPunct="1">
+      <a:lvl1pPr algn="ctr" defTabSz="457200" rtl="0" eaLnBrk="1" latinLnBrk="0" hangingPunct="1">
         <a:spcBef>
           <a:spcPct val="0"/>
         </a:spcBef>
@@ -2262,7 +2289,7 @@
           <a:p>
             <a:fld id="{F2CC31B8-D55E-3142-A1F8-FCFE86EBD46B}" type="datetime1">
               <a:rPr lang="en-US" smtClean="0"/>
-              <a:t>06-Dec-17</a:t>
+              <a:t>07-Dec-17</a:t>
             </a:fld>
             <a:endParaRPr lang="en-US" dirty="0"/>
           </a:p>
@@ -2728,6 +2755,749 @@
           <p:cNvPr id="2" name="Title 1">
             <a:extLst>
               <a:ext uri="{FF2B5EF4-FFF2-40B4-BE49-F238E27FC236}">
+                <a16:creationId xmlns:a16="http://schemas.microsoft.com/office/drawing/2014/main" id="{EB2DE183-A5D1-446C-93CD-6FBBFD47C4A0}"/>
+              </a:ext>
+            </a:extLst>
+          </p:cNvPr>
+          <p:cNvSpPr>
+            <a:spLocks noGrp="1"/>
+          </p:cNvSpPr>
+          <p:nvPr>
+            <p:ph type="title"/>
+          </p:nvPr>
+        </p:nvSpPr>
+        <p:spPr/>
+        <p:txBody>
+          <a:bodyPr/>
+          <a:lstStyle/>
+          <a:p>
+            <a:r>
+              <a:rPr lang="en-US" dirty="0"/>
+              <a:t>Platform Classification</a:t>
+            </a:r>
+          </a:p>
+        </p:txBody>
+      </p:sp>
+      <p:graphicFrame>
+        <p:nvGraphicFramePr>
+          <p:cNvPr id="6" name="Content Placeholder 5">
+            <a:extLst>
+              <a:ext uri="{FF2B5EF4-FFF2-40B4-BE49-F238E27FC236}">
+                <a16:creationId xmlns:a16="http://schemas.microsoft.com/office/drawing/2014/main" id="{0695C817-B504-4CDF-8875-D24790B70A98}"/>
+              </a:ext>
+            </a:extLst>
+          </p:cNvPr>
+          <p:cNvGraphicFramePr>
+            <a:graphicFrameLocks noGrp="1"/>
+          </p:cNvGraphicFramePr>
+          <p:nvPr>
+            <p:ph idx="1"/>
+            <p:extLst>
+              <p:ext uri="{D42A27DB-BD31-4B8C-83A1-F6EECF244321}">
+                <p14:modId xmlns:p14="http://schemas.microsoft.com/office/powerpoint/2010/main" val="4166490794"/>
+              </p:ext>
+            </p:extLst>
+          </p:nvPr>
+        </p:nvGraphicFramePr>
+        <p:xfrm>
+          <a:off x="1253582" y="2310223"/>
+          <a:ext cx="7239001" cy="1813560"/>
+        </p:xfrm>
+        <a:graphic>
+          <a:graphicData uri="http://schemas.openxmlformats.org/drawingml/2006/table">
+            <a:tbl>
+              <a:tblPr firstRow="1" bandRow="1">
+                <a:tableStyleId>{5C22544A-7EE6-4342-B048-85BDC9FD1C3A}</a:tableStyleId>
+              </a:tblPr>
+              <a:tblGrid>
+                <a:gridCol w="1183005">
+                  <a:extLst>
+                    <a:ext uri="{9D8B030D-6E8A-4147-A177-3AD203B41FA5}">
+                      <a16:colId xmlns:a16="http://schemas.microsoft.com/office/drawing/2014/main" val="3378488676"/>
+                    </a:ext>
+                  </a:extLst>
+                </a:gridCol>
+                <a:gridCol w="1105218">
+                  <a:extLst>
+                    <a:ext uri="{9D8B030D-6E8A-4147-A177-3AD203B41FA5}">
+                      <a16:colId xmlns:a16="http://schemas.microsoft.com/office/drawing/2014/main" val="3569142502"/>
+                    </a:ext>
+                  </a:extLst>
+                </a:gridCol>
+                <a:gridCol w="1446530">
+                  <a:extLst>
+                    <a:ext uri="{9D8B030D-6E8A-4147-A177-3AD203B41FA5}">
+                      <a16:colId xmlns:a16="http://schemas.microsoft.com/office/drawing/2014/main" val="2028368127"/>
+                    </a:ext>
+                  </a:extLst>
+                </a:gridCol>
+                <a:gridCol w="1756093">
+                  <a:extLst>
+                    <a:ext uri="{9D8B030D-6E8A-4147-A177-3AD203B41FA5}">
+                      <a16:colId xmlns:a16="http://schemas.microsoft.com/office/drawing/2014/main" val="4277578378"/>
+                    </a:ext>
+                  </a:extLst>
+                </a:gridCol>
+                <a:gridCol w="1748155">
+                  <a:extLst>
+                    <a:ext uri="{9D8B030D-6E8A-4147-A177-3AD203B41FA5}">
+                      <a16:colId xmlns:a16="http://schemas.microsoft.com/office/drawing/2014/main" val="4143046316"/>
+                    </a:ext>
+                  </a:extLst>
+                </a:gridCol>
+              </a:tblGrid>
+              <a:tr h="0">
+                <a:tc>
+                  <a:txBody>
+                    <a:bodyPr/>
+                    <a:lstStyle/>
+                    <a:p>
+                      <a:pPr algn="ctr"/>
+                      <a:r>
+                        <a:rPr lang="en-US" sz="1100" dirty="0"/>
+                        <a:t>Method</a:t>
+                      </a:r>
+                    </a:p>
+                  </a:txBody>
+                  <a:tcPr anchor="ctr"/>
+                </a:tc>
+                <a:tc>
+                  <a:txBody>
+                    <a:bodyPr/>
+                    <a:lstStyle/>
+                    <a:p>
+                      <a:pPr algn="ctr"/>
+                      <a:r>
+                        <a:rPr lang="en-US" sz="1100" dirty="0"/>
+                        <a:t>Accuracy (%)</a:t>
+                      </a:r>
+                    </a:p>
+                  </a:txBody>
+                  <a:tcPr anchor="ctr"/>
+                </a:tc>
+                <a:tc>
+                  <a:txBody>
+                    <a:bodyPr/>
+                    <a:lstStyle/>
+                    <a:p>
+                      <a:pPr algn="ctr"/>
+                      <a:r>
+                        <a:rPr lang="en-US" sz="1100" dirty="0"/>
+                        <a:t>Train Accuracy(%)</a:t>
+                      </a:r>
+                    </a:p>
+                  </a:txBody>
+                  <a:tcPr anchor="ctr"/>
+                </a:tc>
+                <a:tc>
+                  <a:txBody>
+                    <a:bodyPr/>
+                    <a:lstStyle/>
+                    <a:p>
+                      <a:pPr algn="ctr"/>
+                      <a:r>
+                        <a:rPr lang="en-US" sz="1100" dirty="0"/>
+                        <a:t>Accuracy with PCA (%)</a:t>
+                      </a:r>
+                    </a:p>
+                  </a:txBody>
+                  <a:tcPr anchor="ctr"/>
+                </a:tc>
+                <a:tc>
+                  <a:txBody>
+                    <a:bodyPr/>
+                    <a:lstStyle/>
+                    <a:p>
+                      <a:pPr marL="0" marR="0" lvl="0" indent="0" algn="ctr" defTabSz="457200" rtl="0" eaLnBrk="1" fontAlgn="auto" latinLnBrk="0" hangingPunct="1">
+                        <a:lnSpc>
+                          <a:spcPct val="100000"/>
+                        </a:lnSpc>
+                        <a:spcBef>
+                          <a:spcPts val="0"/>
+                        </a:spcBef>
+                        <a:spcAft>
+                          <a:spcPts val="0"/>
+                        </a:spcAft>
+                        <a:buClrTx/>
+                        <a:buSzTx/>
+                        <a:buFontTx/>
+                        <a:buNone/>
+                        <a:tabLst/>
+                        <a:defRPr/>
+                      </a:pPr>
+                      <a:r>
+                        <a:rPr lang="en-US" sz="1100" dirty="0"/>
+                        <a:t>Accuracy with LDA (%)</a:t>
+                      </a:r>
+                    </a:p>
+                  </a:txBody>
+                  <a:tcPr anchor="ctr"/>
+                </a:tc>
+                <a:extLst>
+                  <a:ext uri="{0D108BD9-81ED-4DB2-BD59-A6C34878D82A}">
+                    <a16:rowId xmlns:a16="http://schemas.microsoft.com/office/drawing/2014/main" val="1697802404"/>
+                  </a:ext>
+                </a:extLst>
+              </a:tr>
+              <a:tr h="145920">
+                <a:tc>
+                  <a:txBody>
+                    <a:bodyPr/>
+                    <a:lstStyle/>
+                    <a:p>
+                      <a:pPr algn="ctr"/>
+                      <a:r>
+                        <a:rPr lang="en-US" sz="1100" dirty="0"/>
+                        <a:t>KNN</a:t>
+                      </a:r>
+                    </a:p>
+                  </a:txBody>
+                  <a:tcPr anchor="ctr"/>
+                </a:tc>
+                <a:tc>
+                  <a:txBody>
+                    <a:bodyPr/>
+                    <a:lstStyle/>
+                    <a:p>
+                      <a:pPr algn="ctr"/>
+                      <a:r>
+                        <a:rPr lang="en-US" sz="1100" dirty="0"/>
+                        <a:t>30.84</a:t>
+                      </a:r>
+                    </a:p>
+                  </a:txBody>
+                  <a:tcPr anchor="ctr"/>
+                </a:tc>
+                <a:tc>
+                  <a:txBody>
+                    <a:bodyPr/>
+                    <a:lstStyle/>
+                    <a:p>
+                      <a:pPr algn="ctr"/>
+                      <a:r>
+                        <a:rPr lang="en-US" sz="1100" dirty="0"/>
+                        <a:t>39.91</a:t>
+                      </a:r>
+                    </a:p>
+                  </a:txBody>
+                  <a:tcPr anchor="ctr"/>
+                </a:tc>
+                <a:tc>
+                  <a:txBody>
+                    <a:bodyPr/>
+                    <a:lstStyle/>
+                    <a:p>
+                      <a:pPr algn="ctr"/>
+                      <a:r>
+                        <a:rPr lang="en-US" sz="1100" dirty="0"/>
+                        <a:t>30.84</a:t>
+                      </a:r>
+                    </a:p>
+                  </a:txBody>
+                  <a:tcPr anchor="ctr"/>
+                </a:tc>
+                <a:tc>
+                  <a:txBody>
+                    <a:bodyPr/>
+                    <a:lstStyle/>
+                    <a:p>
+                      <a:pPr algn="ctr"/>
+                      <a:r>
+                        <a:rPr lang="en-US" sz="1100" dirty="0"/>
+                        <a:t>44.98</a:t>
+                      </a:r>
+                    </a:p>
+                  </a:txBody>
+                  <a:tcPr anchor="ctr"/>
+                </a:tc>
+                <a:extLst>
+                  <a:ext uri="{0D108BD9-81ED-4DB2-BD59-A6C34878D82A}">
+                    <a16:rowId xmlns:a16="http://schemas.microsoft.com/office/drawing/2014/main" val="253030030"/>
+                  </a:ext>
+                </a:extLst>
+              </a:tr>
+              <a:tr h="0">
+                <a:tc>
+                  <a:txBody>
+                    <a:bodyPr/>
+                    <a:lstStyle/>
+                    <a:p>
+                      <a:pPr algn="ctr"/>
+                      <a:r>
+                        <a:rPr lang="en-US" sz="1100" dirty="0"/>
+                        <a:t>Naïve Bayes</a:t>
+                      </a:r>
+                    </a:p>
+                  </a:txBody>
+                  <a:tcPr anchor="ctr"/>
+                </a:tc>
+                <a:tc>
+                  <a:txBody>
+                    <a:bodyPr/>
+                    <a:lstStyle/>
+                    <a:p>
+                      <a:pPr algn="ctr"/>
+                      <a:r>
+                        <a:rPr lang="en-US" sz="1100" dirty="0"/>
+                        <a:t>27.69</a:t>
+                      </a:r>
+                    </a:p>
+                  </a:txBody>
+                  <a:tcPr anchor="ctr"/>
+                </a:tc>
+                <a:tc>
+                  <a:txBody>
+                    <a:bodyPr/>
+                    <a:lstStyle/>
+                    <a:p>
+                      <a:pPr algn="ctr"/>
+                      <a:r>
+                        <a:rPr lang="en-US" sz="1100" dirty="0"/>
+                        <a:t>27.18</a:t>
+                      </a:r>
+                    </a:p>
+                  </a:txBody>
+                  <a:tcPr anchor="ctr"/>
+                </a:tc>
+                <a:tc>
+                  <a:txBody>
+                    <a:bodyPr/>
+                    <a:lstStyle/>
+                    <a:p>
+                      <a:pPr algn="ctr"/>
+                      <a:r>
+                        <a:rPr lang="en-US" sz="1100" dirty="0"/>
+                        <a:t>24.84</a:t>
+                      </a:r>
+                    </a:p>
+                  </a:txBody>
+                  <a:tcPr anchor="ctr"/>
+                </a:tc>
+                <a:tc>
+                  <a:txBody>
+                    <a:bodyPr/>
+                    <a:lstStyle/>
+                    <a:p>
+                      <a:pPr algn="ctr"/>
+                      <a:r>
+                        <a:rPr lang="en-US" sz="1100" dirty="0"/>
+                        <a:t>31.50</a:t>
+                      </a:r>
+                    </a:p>
+                  </a:txBody>
+                  <a:tcPr anchor="ctr"/>
+                </a:tc>
+                <a:extLst>
+                  <a:ext uri="{0D108BD9-81ED-4DB2-BD59-A6C34878D82A}">
+                    <a16:rowId xmlns:a16="http://schemas.microsoft.com/office/drawing/2014/main" val="3596063314"/>
+                  </a:ext>
+                </a:extLst>
+              </a:tr>
+              <a:tr h="0">
+                <a:tc>
+                  <a:txBody>
+                    <a:bodyPr/>
+                    <a:lstStyle/>
+                    <a:p>
+                      <a:pPr algn="ctr"/>
+                      <a:r>
+                        <a:rPr lang="en-US" sz="1100" dirty="0"/>
+                        <a:t>Decision Tree</a:t>
+                      </a:r>
+                    </a:p>
+                  </a:txBody>
+                  <a:tcPr anchor="ctr"/>
+                </a:tc>
+                <a:tc>
+                  <a:txBody>
+                    <a:bodyPr/>
+                    <a:lstStyle/>
+                    <a:p>
+                      <a:pPr algn="ctr"/>
+                      <a:r>
+                        <a:rPr lang="en-US" sz="1100" dirty="0"/>
+                        <a:t>59.85</a:t>
+                      </a:r>
+                    </a:p>
+                  </a:txBody>
+                  <a:tcPr anchor="ctr"/>
+                </a:tc>
+                <a:tc>
+                  <a:txBody>
+                    <a:bodyPr/>
+                    <a:lstStyle/>
+                    <a:p>
+                      <a:pPr algn="ctr"/>
+                      <a:r>
+                        <a:rPr lang="en-US" sz="1100" dirty="0"/>
+                        <a:t>84.78</a:t>
+                      </a:r>
+                    </a:p>
+                  </a:txBody>
+                  <a:tcPr anchor="ctr"/>
+                </a:tc>
+                <a:tc>
+                  <a:txBody>
+                    <a:bodyPr/>
+                    <a:lstStyle/>
+                    <a:p>
+                      <a:pPr algn="ctr"/>
+                      <a:r>
+                        <a:rPr lang="en-US" sz="1100" dirty="0"/>
+                        <a:t>47.69</a:t>
+                      </a:r>
+                    </a:p>
+                  </a:txBody>
+                  <a:tcPr anchor="ctr"/>
+                </a:tc>
+                <a:tc>
+                  <a:txBody>
+                    <a:bodyPr/>
+                    <a:lstStyle/>
+                    <a:p>
+                      <a:pPr algn="ctr"/>
+                      <a:r>
+                        <a:rPr lang="en-US" sz="1100" dirty="0"/>
+                        <a:t>38.68</a:t>
+                      </a:r>
+                    </a:p>
+                  </a:txBody>
+                  <a:tcPr anchor="ctr"/>
+                </a:tc>
+                <a:extLst>
+                  <a:ext uri="{0D108BD9-81ED-4DB2-BD59-A6C34878D82A}">
+                    <a16:rowId xmlns:a16="http://schemas.microsoft.com/office/drawing/2014/main" val="475963419"/>
+                  </a:ext>
+                </a:extLst>
+              </a:tr>
+              <a:tr h="0">
+                <a:tc>
+                  <a:txBody>
+                    <a:bodyPr/>
+                    <a:lstStyle/>
+                    <a:p>
+                      <a:pPr algn="ctr"/>
+                      <a:r>
+                        <a:rPr lang="en-US" sz="1100" dirty="0"/>
+                        <a:t>Random Forest</a:t>
+                      </a:r>
+                    </a:p>
+                  </a:txBody>
+                  <a:tcPr anchor="ctr"/>
+                </a:tc>
+                <a:tc>
+                  <a:txBody>
+                    <a:bodyPr/>
+                    <a:lstStyle/>
+                    <a:p>
+                      <a:pPr algn="ctr"/>
+                      <a:r>
+                        <a:rPr lang="en-US" sz="1100" dirty="0"/>
+                        <a:t>65.49</a:t>
+                      </a:r>
+                    </a:p>
+                  </a:txBody>
+                  <a:tcPr anchor="ctr"/>
+                </a:tc>
+                <a:tc>
+                  <a:txBody>
+                    <a:bodyPr/>
+                    <a:lstStyle/>
+                    <a:p>
+                      <a:pPr algn="ctr"/>
+                      <a:r>
+                        <a:rPr lang="en-US" sz="1100" dirty="0"/>
+                        <a:t>92.54</a:t>
+                      </a:r>
+                    </a:p>
+                  </a:txBody>
+                  <a:tcPr anchor="ctr"/>
+                </a:tc>
+                <a:tc>
+                  <a:txBody>
+                    <a:bodyPr/>
+                    <a:lstStyle/>
+                    <a:p>
+                      <a:pPr algn="ctr"/>
+                      <a:r>
+                        <a:rPr lang="en-US" sz="1100" dirty="0"/>
+                        <a:t>47.18</a:t>
+                      </a:r>
+                    </a:p>
+                  </a:txBody>
+                  <a:tcPr anchor="ctr"/>
+                </a:tc>
+                <a:tc>
+                  <a:txBody>
+                    <a:bodyPr/>
+                    <a:lstStyle/>
+                    <a:p>
+                      <a:pPr algn="ctr"/>
+                      <a:r>
+                        <a:rPr lang="en-US" sz="1100" dirty="0"/>
+                        <a:t>38.32</a:t>
+                      </a:r>
+                    </a:p>
+                  </a:txBody>
+                  <a:tcPr anchor="ctr"/>
+                </a:tc>
+                <a:extLst>
+                  <a:ext uri="{0D108BD9-81ED-4DB2-BD59-A6C34878D82A}">
+                    <a16:rowId xmlns:a16="http://schemas.microsoft.com/office/drawing/2014/main" val="2449865420"/>
+                  </a:ext>
+                </a:extLst>
+              </a:tr>
+              <a:tr h="0">
+                <a:tc>
+                  <a:txBody>
+                    <a:bodyPr/>
+                    <a:lstStyle/>
+                    <a:p>
+                      <a:pPr algn="ctr"/>
+                      <a:r>
+                        <a:rPr lang="en-US" sz="1100" dirty="0"/>
+                        <a:t>SVM (linear)</a:t>
+                      </a:r>
+                    </a:p>
+                  </a:txBody>
+                  <a:tcPr anchor="ctr"/>
+                </a:tc>
+                <a:tc>
+                  <a:txBody>
+                    <a:bodyPr/>
+                    <a:lstStyle/>
+                    <a:p>
+                      <a:pPr algn="ctr"/>
+                      <a:r>
+                        <a:rPr lang="en-US" sz="1100" dirty="0"/>
+                        <a:t>44.03</a:t>
+                      </a:r>
+                    </a:p>
+                  </a:txBody>
+                  <a:tcPr anchor="ctr"/>
+                </a:tc>
+                <a:tc>
+                  <a:txBody>
+                    <a:bodyPr/>
+                    <a:lstStyle/>
+                    <a:p>
+                      <a:pPr algn="ctr"/>
+                      <a:r>
+                        <a:rPr lang="en-US" sz="1100" dirty="0"/>
+                        <a:t>46.93</a:t>
+                      </a:r>
+                    </a:p>
+                  </a:txBody>
+                  <a:tcPr anchor="ctr"/>
+                </a:tc>
+                <a:tc>
+                  <a:txBody>
+                    <a:bodyPr/>
+                    <a:lstStyle/>
+                    <a:p>
+                      <a:pPr algn="ctr"/>
+                      <a:r>
+                        <a:rPr lang="en-US" sz="1100" dirty="0"/>
+                        <a:t>51.79</a:t>
+                      </a:r>
+                    </a:p>
+                  </a:txBody>
+                  <a:tcPr anchor="ctr"/>
+                </a:tc>
+                <a:tc>
+                  <a:txBody>
+                    <a:bodyPr/>
+                    <a:lstStyle/>
+                    <a:p>
+                      <a:pPr algn="ctr"/>
+                      <a:r>
+                        <a:rPr lang="en-US" sz="1100" dirty="0"/>
+                        <a:t>59.78</a:t>
+                      </a:r>
+                    </a:p>
+                  </a:txBody>
+                  <a:tcPr anchor="ctr"/>
+                </a:tc>
+                <a:extLst>
+                  <a:ext uri="{0D108BD9-81ED-4DB2-BD59-A6C34878D82A}">
+                    <a16:rowId xmlns:a16="http://schemas.microsoft.com/office/drawing/2014/main" val="1391758319"/>
+                  </a:ext>
+                </a:extLst>
+              </a:tr>
+              <a:tr h="0">
+                <a:tc>
+                  <a:txBody>
+                    <a:bodyPr/>
+                    <a:lstStyle/>
+                    <a:p>
+                      <a:pPr algn="ctr"/>
+                      <a:r>
+                        <a:rPr lang="en-US" sz="1100" dirty="0"/>
+                        <a:t>SVM (radial)</a:t>
+                      </a:r>
+                    </a:p>
+                  </a:txBody>
+                  <a:tcPr anchor="ctr"/>
+                </a:tc>
+                <a:tc>
+                  <a:txBody>
+                    <a:bodyPr/>
+                    <a:lstStyle/>
+                    <a:p>
+                      <a:pPr algn="ctr"/>
+                      <a:r>
+                        <a:rPr lang="en-US" sz="1100" dirty="0"/>
+                        <a:t>34.80</a:t>
+                      </a:r>
+                    </a:p>
+                  </a:txBody>
+                  <a:tcPr anchor="ctr"/>
+                </a:tc>
+                <a:tc>
+                  <a:txBody>
+                    <a:bodyPr/>
+                    <a:lstStyle/>
+                    <a:p>
+                      <a:pPr algn="ctr"/>
+                      <a:r>
+                        <a:rPr lang="en-US" sz="1100" dirty="0"/>
+                        <a:t>43.35</a:t>
+                      </a:r>
+                    </a:p>
+                  </a:txBody>
+                  <a:tcPr anchor="ctr"/>
+                </a:tc>
+                <a:tc>
+                  <a:txBody>
+                    <a:bodyPr/>
+                    <a:lstStyle/>
+                    <a:p>
+                      <a:pPr algn="ctr"/>
+                      <a:r>
+                        <a:rPr lang="en-US" sz="1100" dirty="0"/>
+                        <a:t>34.80</a:t>
+                      </a:r>
+                    </a:p>
+                  </a:txBody>
+                  <a:tcPr anchor="ctr"/>
+                </a:tc>
+                <a:tc>
+                  <a:txBody>
+                    <a:bodyPr/>
+                    <a:lstStyle/>
+                    <a:p>
+                      <a:pPr algn="ctr"/>
+                      <a:r>
+                        <a:rPr lang="en-US" sz="1100" dirty="0"/>
+                        <a:t>53.55</a:t>
+                      </a:r>
+                    </a:p>
+                  </a:txBody>
+                  <a:tcPr anchor="ctr"/>
+                </a:tc>
+                <a:extLst>
+                  <a:ext uri="{0D108BD9-81ED-4DB2-BD59-A6C34878D82A}">
+                    <a16:rowId xmlns:a16="http://schemas.microsoft.com/office/drawing/2014/main" val="3784030699"/>
+                  </a:ext>
+                </a:extLst>
+              </a:tr>
+            </a:tbl>
+          </a:graphicData>
+        </a:graphic>
+      </p:graphicFrame>
+      <p:sp>
+        <p:nvSpPr>
+          <p:cNvPr id="4" name="Date Placeholder 3">
+            <a:extLst>
+              <a:ext uri="{FF2B5EF4-FFF2-40B4-BE49-F238E27FC236}">
+                <a16:creationId xmlns:a16="http://schemas.microsoft.com/office/drawing/2014/main" id="{3A58F7D9-C22C-43D3-8E0A-70B15B0862B4}"/>
+              </a:ext>
+            </a:extLst>
+          </p:cNvPr>
+          <p:cNvSpPr>
+            <a:spLocks noGrp="1"/>
+          </p:cNvSpPr>
+          <p:nvPr>
+            <p:ph type="dt" sz="half" idx="10"/>
+          </p:nvPr>
+        </p:nvSpPr>
+        <p:spPr/>
+        <p:txBody>
+          <a:bodyPr/>
+          <a:lstStyle/>
+          <a:p>
+            <a:fld id="{EA0B2E4C-09A0-1C47-AC04-653E7CA38318}" type="datetime1">
+              <a:rPr lang="en-US" smtClean="0"/>
+              <a:t>07-Dec-17</a:t>
+            </a:fld>
+            <a:endParaRPr lang="en-US"/>
+          </a:p>
+        </p:txBody>
+      </p:sp>
+      <p:sp>
+        <p:nvSpPr>
+          <p:cNvPr id="5" name="Footer Placeholder 4">
+            <a:extLst>
+              <a:ext uri="{FF2B5EF4-FFF2-40B4-BE49-F238E27FC236}">
+                <a16:creationId xmlns:a16="http://schemas.microsoft.com/office/drawing/2014/main" id="{B034D441-E3FA-41BA-9C6B-52FE04166311}"/>
+              </a:ext>
+            </a:extLst>
+          </p:cNvPr>
+          <p:cNvSpPr>
+            <a:spLocks noGrp="1"/>
+          </p:cNvSpPr>
+          <p:nvPr>
+            <p:ph type="ftr" sz="quarter" idx="11"/>
+          </p:nvPr>
+        </p:nvSpPr>
+        <p:spPr/>
+        <p:txBody>
+          <a:bodyPr/>
+          <a:lstStyle/>
+          <a:p>
+            <a:r>
+              <a:rPr lang="pt-BR"/>
+              <a:t>Instituto Superior Técnico </a:t>
+            </a:r>
+            <a:endParaRPr lang="en-US"/>
+          </a:p>
+        </p:txBody>
+      </p:sp>
+    </p:spTree>
+    <p:extLst>
+      <p:ext uri="{BB962C8B-B14F-4D97-AF65-F5344CB8AC3E}">
+        <p14:creationId xmlns:p14="http://schemas.microsoft.com/office/powerpoint/2010/main" val="585645261"/>
+      </p:ext>
+    </p:extLst>
+  </p:cSld>
+  <p:clrMapOvr>
+    <a:masterClrMapping/>
+  </p:clrMapOvr>
+</p:sld>
+</file>
+
+<file path=ppt/slides/slide11.xml><?xml version="1.0" encoding="utf-8"?>
+<p:sld xmlns:a="http://schemas.openxmlformats.org/drawingml/2006/main" xmlns:r="http://schemas.openxmlformats.org/officeDocument/2006/relationships" xmlns:p="http://schemas.openxmlformats.org/presentationml/2006/main">
+  <p:cSld>
+    <p:spTree>
+      <p:nvGrpSpPr>
+        <p:cNvPr id="1" name=""/>
+        <p:cNvGrpSpPr/>
+        <p:nvPr/>
+      </p:nvGrpSpPr>
+      <p:grpSpPr>
+        <a:xfrm>
+          <a:off x="0" y="0"/>
+          <a:ext cx="0" cy="0"/>
+          <a:chOff x="0" y="0"/>
+          <a:chExt cx="0" cy="0"/>
+        </a:xfrm>
+      </p:grpSpPr>
+      <p:sp>
+        <p:nvSpPr>
+          <p:cNvPr id="2" name="Title 1">
+            <a:extLst>
+              <a:ext uri="{FF2B5EF4-FFF2-40B4-BE49-F238E27FC236}">
                 <a16:creationId xmlns:a16="http://schemas.microsoft.com/office/drawing/2014/main" id="{8F36FE65-625F-4076-B261-6FDE4372DA51}"/>
               </a:ext>
             </a:extLst>
@@ -2744,10 +3514,7 @@
           <a:bodyPr/>
           <a:lstStyle/>
           <a:p>
-            <a:r>
-              <a:rPr lang="en-US" dirty="0"/>
-              <a:t>Unsupervised Learning</a:t>
-            </a:r>
+            <a:endParaRPr lang="en-US" dirty="0"/>
           </a:p>
         </p:txBody>
       </p:sp>
@@ -2799,7 +3566,7 @@
           <a:p>
             <a:fld id="{EA0B2E4C-09A0-1C47-AC04-653E7CA38318}" type="datetime1">
               <a:rPr lang="en-US" smtClean="0"/>
-              <a:t>06-Dec-17</a:t>
+              <a:t>07-Dec-17</a:t>
             </a:fld>
             <a:endParaRPr lang="en-US"/>
           </a:p>
@@ -2880,7 +3647,12 @@
             <p:ph type="title"/>
           </p:nvPr>
         </p:nvSpPr>
-        <p:spPr/>
+        <p:spPr>
+          <a:xfrm>
+            <a:off x="686388" y="136525"/>
+            <a:ext cx="7655237" cy="868363"/>
+          </a:xfrm>
+        </p:spPr>
         <p:txBody>
           <a:bodyPr/>
           <a:lstStyle/>
@@ -2962,7 +3734,7 @@
           <a:p>
             <a:fld id="{EA0B2E4C-09A0-1C47-AC04-653E7CA38318}" type="datetime1">
               <a:rPr lang="en-US" smtClean="0"/>
-              <a:t>06-Dec-17</a:t>
+              <a:t>07-Dec-17</a:t>
             </a:fld>
             <a:endParaRPr lang="en-US"/>
           </a:p>
@@ -4025,7 +4797,12 @@
             <p:ph type="title"/>
           </p:nvPr>
         </p:nvSpPr>
-        <p:spPr/>
+        <p:spPr>
+          <a:xfrm>
+            <a:off x="743283" y="136525"/>
+            <a:ext cx="7655237" cy="868363"/>
+          </a:xfrm>
+        </p:spPr>
         <p:txBody>
           <a:bodyPr/>
           <a:lstStyle/>
@@ -4060,7 +4837,7 @@
           <a:p>
             <a:fld id="{EA0B2E4C-09A0-1C47-AC04-653E7CA38318}" type="datetime1">
               <a:rPr lang="en-US" smtClean="0"/>
-              <a:t>06-Dec-17</a:t>
+              <a:t>07-Dec-17</a:t>
             </a:fld>
             <a:endParaRPr lang="en-US"/>
           </a:p>
@@ -4130,7 +4907,7 @@
           <p:cNvPr id="2" name="Title 1">
             <a:extLst>
               <a:ext uri="{FF2B5EF4-FFF2-40B4-BE49-F238E27FC236}">
-                <a16:creationId xmlns:a16="http://schemas.microsoft.com/office/drawing/2014/main" id="{D3CAA16F-C77B-4886-A8E9-1DD768A0F1FD}"/>
+                <a16:creationId xmlns:a16="http://schemas.microsoft.com/office/drawing/2014/main" id="{4E308BED-A49E-47C0-B071-27FA1F17FD19}"/>
               </a:ext>
             </a:extLst>
           </p:cNvPr>
@@ -4143,8 +4920,8 @@
         </p:nvSpPr>
         <p:spPr>
           <a:xfrm>
-            <a:off x="743285" y="1449340"/>
-            <a:ext cx="2289848" cy="868363"/>
+            <a:off x="743284" y="141945"/>
+            <a:ext cx="7655237" cy="868363"/>
           </a:xfrm>
         </p:spPr>
         <p:txBody>
@@ -4163,7 +4940,7 @@
           <p:cNvPr id="4" name="Date Placeholder 3">
             <a:extLst>
               <a:ext uri="{FF2B5EF4-FFF2-40B4-BE49-F238E27FC236}">
-                <a16:creationId xmlns:a16="http://schemas.microsoft.com/office/drawing/2014/main" id="{A201EBB2-82CE-4D2A-893E-853398FB564A}"/>
+                <a16:creationId xmlns:a16="http://schemas.microsoft.com/office/drawing/2014/main" id="{1AB39341-C1BF-463C-9BFD-3CC85078E3A1}"/>
               </a:ext>
             </a:extLst>
           </p:cNvPr>
@@ -4181,7 +4958,7 @@
           <a:p>
             <a:fld id="{EA0B2E4C-09A0-1C47-AC04-653E7CA38318}" type="datetime1">
               <a:rPr lang="en-US" smtClean="0"/>
-              <a:t>06-Dec-17</a:t>
+              <a:t>07-Dec-17</a:t>
             </a:fld>
             <a:endParaRPr lang="en-US"/>
           </a:p>
@@ -4192,7 +4969,7 @@
           <p:cNvPr id="5" name="Footer Placeholder 4">
             <a:extLst>
               <a:ext uri="{FF2B5EF4-FFF2-40B4-BE49-F238E27FC236}">
-                <a16:creationId xmlns:a16="http://schemas.microsoft.com/office/drawing/2014/main" id="{4330116C-C09C-4855-8BE1-A63BAEB123F1}"/>
+                <a16:creationId xmlns:a16="http://schemas.microsoft.com/office/drawing/2014/main" id="{F8965454-9897-43FD-BE19-821EA7E5D00C}"/>
               </a:ext>
             </a:extLst>
           </p:cNvPr>
@@ -4216,47 +4993,12 @@
           </a:p>
         </p:txBody>
       </p:sp>
-      <p:sp>
-        <p:nvSpPr>
-          <p:cNvPr id="6" name="TextBox 5">
+      <p:pic>
+        <p:nvPicPr>
+          <p:cNvPr id="6" name="Picture 5">
             <a:extLst>
               <a:ext uri="{FF2B5EF4-FFF2-40B4-BE49-F238E27FC236}">
-                <a16:creationId xmlns:a16="http://schemas.microsoft.com/office/drawing/2014/main" id="{3617BBF4-6C44-4519-8B49-494E4927B7D5}"/>
-              </a:ext>
-            </a:extLst>
-          </p:cNvPr>
-          <p:cNvSpPr txBox="1"/>
-          <p:nvPr/>
-        </p:nvSpPr>
-        <p:spPr>
-          <a:xfrm>
-            <a:off x="3412273" y="1695135"/>
-            <a:ext cx="5140712" cy="369332"/>
-          </a:xfrm>
-          <a:prstGeom prst="rect">
-            <a:avLst/>
-          </a:prstGeom>
-          <a:noFill/>
-        </p:spPr>
-        <p:txBody>
-          <a:bodyPr wrap="square" rtlCol="0">
-            <a:spAutoFit/>
-          </a:bodyPr>
-          <a:lstStyle/>
-          <a:p>
-            <a:r>
-              <a:rPr lang="en-US" dirty="0"/>
-              <a:t>Yearly Sales Distribution</a:t>
-            </a:r>
-          </a:p>
-        </p:txBody>
-      </p:sp>
-      <p:pic>
-        <p:nvPicPr>
-          <p:cNvPr id="8" name="Picture 7">
-            <a:extLst>
-              <a:ext uri="{FF2B5EF4-FFF2-40B4-BE49-F238E27FC236}">
-                <a16:creationId xmlns:a16="http://schemas.microsoft.com/office/drawing/2014/main" id="{948E87A8-CEEF-4772-BB96-CEEE2343A514}"/>
+                <a16:creationId xmlns:a16="http://schemas.microsoft.com/office/drawing/2014/main" id="{102A2853-E74D-4D13-B57C-684835E7E561}"/>
               </a:ext>
             </a:extLst>
           </p:cNvPr>
@@ -4273,8 +5015,8 @@
         </p:blipFill>
         <p:spPr>
           <a:xfrm>
-            <a:off x="1326379" y="2133940"/>
-            <a:ext cx="6514636" cy="4280712"/>
+            <a:off x="1642196" y="1430057"/>
+            <a:ext cx="5857411" cy="4984595"/>
           </a:xfrm>
           <a:prstGeom prst="rect">
             <a:avLst/>
@@ -4284,7 +5026,7 @@
     </p:spTree>
     <p:extLst>
       <p:ext uri="{BB962C8B-B14F-4D97-AF65-F5344CB8AC3E}">
-        <p14:creationId xmlns:p14="http://schemas.microsoft.com/office/powerpoint/2010/main" val="4275334719"/>
+        <p14:creationId xmlns:p14="http://schemas.microsoft.com/office/powerpoint/2010/main" val="1695776785"/>
       </p:ext>
     </p:extLst>
   </p:cSld>
@@ -4329,7 +5071,7 @@
         </p:nvSpPr>
         <p:spPr>
           <a:xfrm>
-            <a:off x="743285" y="1449340"/>
+            <a:off x="3427076" y="136525"/>
             <a:ext cx="2289848" cy="868363"/>
           </a:xfrm>
         </p:spPr>
@@ -4367,7 +5109,7 @@
           <a:p>
             <a:fld id="{EA0B2E4C-09A0-1C47-AC04-653E7CA38318}" type="datetime1">
               <a:rPr lang="en-US" smtClean="0"/>
-              <a:t>06-Dec-17</a:t>
+              <a:t>07-Dec-17</a:t>
             </a:fld>
             <a:endParaRPr lang="en-US"/>
           </a:p>
@@ -4402,12 +5144,47 @@
           </a:p>
         </p:txBody>
       </p:sp>
+      <p:sp>
+        <p:nvSpPr>
+          <p:cNvPr id="6" name="TextBox 5">
+            <a:extLst>
+              <a:ext uri="{FF2B5EF4-FFF2-40B4-BE49-F238E27FC236}">
+                <a16:creationId xmlns:a16="http://schemas.microsoft.com/office/drawing/2014/main" id="{3617BBF4-6C44-4519-8B49-494E4927B7D5}"/>
+              </a:ext>
+            </a:extLst>
+          </p:cNvPr>
+          <p:cNvSpPr txBox="1"/>
+          <p:nvPr/>
+        </p:nvSpPr>
+        <p:spPr>
+          <a:xfrm>
+            <a:off x="3449444" y="1373746"/>
+            <a:ext cx="5140712" cy="369332"/>
+          </a:xfrm>
+          <a:prstGeom prst="rect">
+            <a:avLst/>
+          </a:prstGeom>
+          <a:noFill/>
+        </p:spPr>
+        <p:txBody>
+          <a:bodyPr wrap="square" rtlCol="0">
+            <a:spAutoFit/>
+          </a:bodyPr>
+          <a:lstStyle/>
+          <a:p>
+            <a:r>
+              <a:rPr lang="en-US" dirty="0"/>
+              <a:t>Yearly Sales Distribution</a:t>
+            </a:r>
+          </a:p>
+        </p:txBody>
+      </p:sp>
       <p:pic>
         <p:nvPicPr>
-          <p:cNvPr id="3" name="Picture 2">
+          <p:cNvPr id="8" name="Picture 7">
             <a:extLst>
               <a:ext uri="{FF2B5EF4-FFF2-40B4-BE49-F238E27FC236}">
-                <a16:creationId xmlns:a16="http://schemas.microsoft.com/office/drawing/2014/main" id="{C7D04D7A-D02B-4B2F-92EB-5920440A8568}"/>
+                <a16:creationId xmlns:a16="http://schemas.microsoft.com/office/drawing/2014/main" id="{948E87A8-CEEF-4772-BB96-CEEE2343A514}"/>
               </a:ext>
             </a:extLst>
           </p:cNvPr>
@@ -4424,53 +5201,18 @@
         </p:blipFill>
         <p:spPr>
           <a:xfrm>
-            <a:off x="1608997" y="2317703"/>
-            <a:ext cx="5923809" cy="3590476"/>
+            <a:off x="1017264" y="1743078"/>
+            <a:ext cx="7109472" cy="4671574"/>
           </a:xfrm>
           <a:prstGeom prst="rect">
             <a:avLst/>
           </a:prstGeom>
         </p:spPr>
       </p:pic>
-      <p:sp>
-        <p:nvSpPr>
-          <p:cNvPr id="6" name="TextBox 5">
-            <a:extLst>
-              <a:ext uri="{FF2B5EF4-FFF2-40B4-BE49-F238E27FC236}">
-                <a16:creationId xmlns:a16="http://schemas.microsoft.com/office/drawing/2014/main" id="{3617BBF4-6C44-4519-8B49-494E4927B7D5}"/>
-              </a:ext>
-            </a:extLst>
-          </p:cNvPr>
-          <p:cNvSpPr txBox="1"/>
-          <p:nvPr/>
-        </p:nvSpPr>
-        <p:spPr>
-          <a:xfrm>
-            <a:off x="3412273" y="1695135"/>
-            <a:ext cx="5140712" cy="369332"/>
-          </a:xfrm>
-          <a:prstGeom prst="rect">
-            <a:avLst/>
-          </a:prstGeom>
-          <a:noFill/>
-        </p:spPr>
-        <p:txBody>
-          <a:bodyPr wrap="square" rtlCol="0">
-            <a:spAutoFit/>
-          </a:bodyPr>
-          <a:lstStyle/>
-          <a:p>
-            <a:r>
-              <a:rPr lang="en-US" dirty="0"/>
-              <a:t>Platform Distribution</a:t>
-            </a:r>
-          </a:p>
-        </p:txBody>
-      </p:sp>
     </p:spTree>
     <p:extLst>
       <p:ext uri="{BB962C8B-B14F-4D97-AF65-F5344CB8AC3E}">
-        <p14:creationId xmlns:p14="http://schemas.microsoft.com/office/powerpoint/2010/main" val="260282721"/>
+        <p14:creationId xmlns:p14="http://schemas.microsoft.com/office/powerpoint/2010/main" val="4275334719"/>
       </p:ext>
     </p:extLst>
   </p:cSld>
@@ -4499,39 +5241,6 @@
       </p:grpSpPr>
       <p:sp>
         <p:nvSpPr>
-          <p:cNvPr id="2" name="Title 1">
-            <a:extLst>
-              <a:ext uri="{FF2B5EF4-FFF2-40B4-BE49-F238E27FC236}">
-                <a16:creationId xmlns:a16="http://schemas.microsoft.com/office/drawing/2014/main" id="{D3CAA16F-C77B-4886-A8E9-1DD768A0F1FD}"/>
-              </a:ext>
-            </a:extLst>
-          </p:cNvPr>
-          <p:cNvSpPr>
-            <a:spLocks noGrp="1"/>
-          </p:cNvSpPr>
-          <p:nvPr>
-            <p:ph type="title"/>
-          </p:nvPr>
-        </p:nvSpPr>
-        <p:spPr>
-          <a:xfrm>
-            <a:off x="743285" y="1449340"/>
-            <a:ext cx="2289848" cy="868363"/>
-          </a:xfrm>
-        </p:spPr>
-        <p:txBody>
-          <a:bodyPr/>
-          <a:lstStyle/>
-          <a:p>
-            <a:r>
-              <a:rPr lang="en-US" dirty="0"/>
-              <a:t>EDA</a:t>
-            </a:r>
-          </a:p>
-        </p:txBody>
-      </p:sp>
-      <p:sp>
-        <p:nvSpPr>
           <p:cNvPr id="4" name="Date Placeholder 3">
             <a:extLst>
               <a:ext uri="{FF2B5EF4-FFF2-40B4-BE49-F238E27FC236}">
@@ -4553,7 +5262,7 @@
           <a:p>
             <a:fld id="{EA0B2E4C-09A0-1C47-AC04-653E7CA38318}" type="datetime1">
               <a:rPr lang="en-US" smtClean="0"/>
-              <a:t>06-Dec-17</a:t>
+              <a:t>07-Dec-17</a:t>
             </a:fld>
             <a:endParaRPr lang="en-US"/>
           </a:p>
@@ -4588,6 +5297,36 @@
           </a:p>
         </p:txBody>
       </p:sp>
+      <p:pic>
+        <p:nvPicPr>
+          <p:cNvPr id="3" name="Picture 2">
+            <a:extLst>
+              <a:ext uri="{FF2B5EF4-FFF2-40B4-BE49-F238E27FC236}">
+                <a16:creationId xmlns:a16="http://schemas.microsoft.com/office/drawing/2014/main" id="{C7D04D7A-D02B-4B2F-92EB-5920440A8568}"/>
+              </a:ext>
+            </a:extLst>
+          </p:cNvPr>
+          <p:cNvPicPr>
+            <a:picLocks noChangeAspect="1"/>
+          </p:cNvPicPr>
+          <p:nvPr/>
+        </p:nvPicPr>
+        <p:blipFill>
+          <a:blip r:embed="rId2"/>
+          <a:stretch>
+            <a:fillRect/>
+          </a:stretch>
+        </p:blipFill>
+        <p:spPr>
+          <a:xfrm>
+            <a:off x="886513" y="1948370"/>
+            <a:ext cx="7368773" cy="4466282"/>
+          </a:xfrm>
+          <a:prstGeom prst="rect">
+            <a:avLst/>
+          </a:prstGeom>
+        </p:spPr>
+      </p:pic>
       <p:sp>
         <p:nvSpPr>
           <p:cNvPr id="6" name="TextBox 5">
@@ -4602,7 +5341,183 @@
         </p:nvSpPr>
         <p:spPr>
           <a:xfrm>
-            <a:off x="3412273" y="1695135"/>
+            <a:off x="1361208" y="1456881"/>
+            <a:ext cx="6419385" cy="369332"/>
+          </a:xfrm>
+          <a:prstGeom prst="rect">
+            <a:avLst/>
+          </a:prstGeom>
+          <a:noFill/>
+        </p:spPr>
+        <p:txBody>
+          <a:bodyPr wrap="square" rtlCol="0">
+            <a:spAutoFit/>
+          </a:bodyPr>
+          <a:lstStyle/>
+          <a:p>
+            <a:pPr algn="ctr"/>
+            <a:r>
+              <a:rPr lang="en-US" dirty="0"/>
+              <a:t>Platform Distribution</a:t>
+            </a:r>
+          </a:p>
+        </p:txBody>
+      </p:sp>
+      <p:sp>
+        <p:nvSpPr>
+          <p:cNvPr id="7" name="Title 1">
+            <a:extLst>
+              <a:ext uri="{FF2B5EF4-FFF2-40B4-BE49-F238E27FC236}">
+                <a16:creationId xmlns:a16="http://schemas.microsoft.com/office/drawing/2014/main" id="{DA933E90-184C-400D-96BE-14F0AE873F48}"/>
+              </a:ext>
+            </a:extLst>
+          </p:cNvPr>
+          <p:cNvSpPr txBox="1">
+            <a:spLocks/>
+          </p:cNvSpPr>
+          <p:nvPr/>
+        </p:nvSpPr>
+        <p:spPr>
+          <a:xfrm>
+            <a:off x="3427076" y="136525"/>
+            <a:ext cx="2289848" cy="868363"/>
+          </a:xfrm>
+          <a:prstGeom prst="rect">
+            <a:avLst/>
+          </a:prstGeom>
+        </p:spPr>
+        <p:txBody>
+          <a:bodyPr vert="horz" lIns="91440" tIns="45720" rIns="91440" bIns="45720" rtlCol="0" anchor="ctr">
+            <a:normAutofit/>
+          </a:bodyPr>
+          <a:lstStyle>
+            <a:lvl1pPr algn="ctr" defTabSz="457200" rtl="0" eaLnBrk="1" latinLnBrk="0" hangingPunct="1">
+              <a:spcBef>
+                <a:spcPct val="0"/>
+              </a:spcBef>
+              <a:buNone/>
+              <a:defRPr sz="3600" b="1" i="0" kern="1200">
+                <a:solidFill>
+                  <a:schemeClr val="tx1"/>
+                </a:solidFill>
+                <a:latin typeface="+mj-lt"/>
+                <a:ea typeface="+mj-ea"/>
+                <a:cs typeface="+mj-cs"/>
+              </a:defRPr>
+            </a:lvl1pPr>
+          </a:lstStyle>
+          <a:p>
+            <a:r>
+              <a:rPr lang="en-US"/>
+              <a:t>EDA</a:t>
+            </a:r>
+            <a:endParaRPr lang="en-US" dirty="0"/>
+          </a:p>
+        </p:txBody>
+      </p:sp>
+    </p:spTree>
+    <p:extLst>
+      <p:ext uri="{BB962C8B-B14F-4D97-AF65-F5344CB8AC3E}">
+        <p14:creationId xmlns:p14="http://schemas.microsoft.com/office/powerpoint/2010/main" val="260282721"/>
+      </p:ext>
+    </p:extLst>
+  </p:cSld>
+  <p:clrMapOvr>
+    <a:masterClrMapping/>
+  </p:clrMapOvr>
+</p:sld>
+</file>
+
+<file path=ppt/slides/slide7.xml><?xml version="1.0" encoding="utf-8"?>
+<p:sld xmlns:a="http://schemas.openxmlformats.org/drawingml/2006/main" xmlns:r="http://schemas.openxmlformats.org/officeDocument/2006/relationships" xmlns:p="http://schemas.openxmlformats.org/presentationml/2006/main">
+  <p:cSld>
+    <p:spTree>
+      <p:nvGrpSpPr>
+        <p:cNvPr id="1" name=""/>
+        <p:cNvGrpSpPr/>
+        <p:nvPr/>
+      </p:nvGrpSpPr>
+      <p:grpSpPr>
+        <a:xfrm>
+          <a:off x="0" y="0"/>
+          <a:ext cx="0" cy="0"/>
+          <a:chOff x="0" y="0"/>
+          <a:chExt cx="0" cy="0"/>
+        </a:xfrm>
+      </p:grpSpPr>
+      <p:sp>
+        <p:nvSpPr>
+          <p:cNvPr id="4" name="Date Placeholder 3">
+            <a:extLst>
+              <a:ext uri="{FF2B5EF4-FFF2-40B4-BE49-F238E27FC236}">
+                <a16:creationId xmlns:a16="http://schemas.microsoft.com/office/drawing/2014/main" id="{A201EBB2-82CE-4D2A-893E-853398FB564A}"/>
+              </a:ext>
+            </a:extLst>
+          </p:cNvPr>
+          <p:cNvSpPr>
+            <a:spLocks noGrp="1"/>
+          </p:cNvSpPr>
+          <p:nvPr>
+            <p:ph type="dt" sz="half" idx="10"/>
+          </p:nvPr>
+        </p:nvSpPr>
+        <p:spPr/>
+        <p:txBody>
+          <a:bodyPr/>
+          <a:lstStyle/>
+          <a:p>
+            <a:fld id="{EA0B2E4C-09A0-1C47-AC04-653E7CA38318}" type="datetime1">
+              <a:rPr lang="en-US" smtClean="0"/>
+              <a:t>07-Dec-17</a:t>
+            </a:fld>
+            <a:endParaRPr lang="en-US"/>
+          </a:p>
+        </p:txBody>
+      </p:sp>
+      <p:sp>
+        <p:nvSpPr>
+          <p:cNvPr id="5" name="Footer Placeholder 4">
+            <a:extLst>
+              <a:ext uri="{FF2B5EF4-FFF2-40B4-BE49-F238E27FC236}">
+                <a16:creationId xmlns:a16="http://schemas.microsoft.com/office/drawing/2014/main" id="{4330116C-C09C-4855-8BE1-A63BAEB123F1}"/>
+              </a:ext>
+            </a:extLst>
+          </p:cNvPr>
+          <p:cNvSpPr>
+            <a:spLocks noGrp="1"/>
+          </p:cNvSpPr>
+          <p:nvPr>
+            <p:ph type="ftr" sz="quarter" idx="11"/>
+          </p:nvPr>
+        </p:nvSpPr>
+        <p:spPr/>
+        <p:txBody>
+          <a:bodyPr/>
+          <a:lstStyle/>
+          <a:p>
+            <a:r>
+              <a:rPr lang="pt-BR"/>
+              <a:t>Instituto Superior Técnico </a:t>
+            </a:r>
+            <a:endParaRPr lang="en-US"/>
+          </a:p>
+        </p:txBody>
+      </p:sp>
+      <p:sp>
+        <p:nvSpPr>
+          <p:cNvPr id="6" name="TextBox 5">
+            <a:extLst>
+              <a:ext uri="{FF2B5EF4-FFF2-40B4-BE49-F238E27FC236}">
+                <a16:creationId xmlns:a16="http://schemas.microsoft.com/office/drawing/2014/main" id="{3617BBF4-6C44-4519-8B49-494E4927B7D5}"/>
+              </a:ext>
+            </a:extLst>
+          </p:cNvPr>
+          <p:cNvSpPr txBox="1"/>
+          <p:nvPr/>
+        </p:nvSpPr>
+        <p:spPr>
+          <a:xfrm>
+            <a:off x="2001642" y="1288768"/>
             <a:ext cx="5140712" cy="369332"/>
           </a:xfrm>
           <a:prstGeom prst="rect">
@@ -4616,6 +5531,7 @@
           </a:bodyPr>
           <a:lstStyle/>
           <a:p>
+            <a:pPr algn="ctr"/>
             <a:r>
               <a:rPr lang="en-US" dirty="0"/>
               <a:t>Platform Distribution</a:t>
@@ -4645,14 +5561,47 @@
         </p:blipFill>
         <p:spPr>
           <a:xfrm>
-            <a:off x="1326378" y="2133940"/>
-            <a:ext cx="6491241" cy="4296361"/>
+            <a:off x="969847" y="1646337"/>
+            <a:ext cx="7204302" cy="4768315"/>
           </a:xfrm>
           <a:prstGeom prst="rect">
             <a:avLst/>
           </a:prstGeom>
         </p:spPr>
       </p:pic>
+      <p:sp>
+        <p:nvSpPr>
+          <p:cNvPr id="9" name="Title 1">
+            <a:extLst>
+              <a:ext uri="{FF2B5EF4-FFF2-40B4-BE49-F238E27FC236}">
+                <a16:creationId xmlns:a16="http://schemas.microsoft.com/office/drawing/2014/main" id="{A23E735C-5BE9-462F-AD2F-92A94697DCF6}"/>
+              </a:ext>
+            </a:extLst>
+          </p:cNvPr>
+          <p:cNvSpPr>
+            <a:spLocks noGrp="1"/>
+          </p:cNvSpPr>
+          <p:nvPr>
+            <p:ph type="title"/>
+          </p:nvPr>
+        </p:nvSpPr>
+        <p:spPr>
+          <a:xfrm>
+            <a:off x="3427076" y="136525"/>
+            <a:ext cx="2289848" cy="868363"/>
+          </a:xfrm>
+        </p:spPr>
+        <p:txBody>
+          <a:bodyPr/>
+          <a:lstStyle/>
+          <a:p>
+            <a:r>
+              <a:rPr lang="en-US" dirty="0"/>
+              <a:t>EDA</a:t>
+            </a:r>
+          </a:p>
+        </p:txBody>
+      </p:sp>
     </p:spTree>
     <p:extLst>
       <p:ext uri="{BB962C8B-B14F-4D97-AF65-F5344CB8AC3E}">
@@ -4666,7 +5615,7 @@
 </p:sld>
 </file>
 
-<file path=ppt/slides/slide7.xml><?xml version="1.0" encoding="utf-8"?>
+<file path=ppt/slides/slide8.xml><?xml version="1.0" encoding="utf-8"?>
 <p:sld xmlns:a="http://schemas.openxmlformats.org/drawingml/2006/main" xmlns:r="http://schemas.openxmlformats.org/officeDocument/2006/relationships" xmlns:p="http://schemas.openxmlformats.org/presentationml/2006/main">
   <p:cSld>
     <p:spTree>
@@ -4705,47 +5654,14 @@
         </p:blipFill>
         <p:spPr>
           <a:xfrm>
-            <a:off x="1608997" y="2342367"/>
-            <a:ext cx="5990476" cy="3819048"/>
+            <a:off x="1094124" y="1826213"/>
+            <a:ext cx="7197325" cy="4588439"/>
           </a:xfrm>
           <a:prstGeom prst="rect">
             <a:avLst/>
           </a:prstGeom>
         </p:spPr>
       </p:pic>
-      <p:sp>
-        <p:nvSpPr>
-          <p:cNvPr id="2" name="Title 1">
-            <a:extLst>
-              <a:ext uri="{FF2B5EF4-FFF2-40B4-BE49-F238E27FC236}">
-                <a16:creationId xmlns:a16="http://schemas.microsoft.com/office/drawing/2014/main" id="{D3CAA16F-C77B-4886-A8E9-1DD768A0F1FD}"/>
-              </a:ext>
-            </a:extLst>
-          </p:cNvPr>
-          <p:cNvSpPr>
-            <a:spLocks noGrp="1"/>
-          </p:cNvSpPr>
-          <p:nvPr>
-            <p:ph type="title"/>
-          </p:nvPr>
-        </p:nvSpPr>
-        <p:spPr>
-          <a:xfrm>
-            <a:off x="743285" y="1449340"/>
-            <a:ext cx="2289848" cy="868363"/>
-          </a:xfrm>
-        </p:spPr>
-        <p:txBody>
-          <a:bodyPr/>
-          <a:lstStyle/>
-          <a:p>
-            <a:r>
-              <a:rPr lang="en-US" dirty="0"/>
-              <a:t>EDA</a:t>
-            </a:r>
-          </a:p>
-        </p:txBody>
-      </p:sp>
       <p:sp>
         <p:nvSpPr>
           <p:cNvPr id="4" name="Date Placeholder 3">
@@ -4769,7 +5685,7 @@
           <a:p>
             <a:fld id="{EA0B2E4C-09A0-1C47-AC04-653E7CA38318}" type="datetime1">
               <a:rPr lang="en-US" smtClean="0"/>
-              <a:t>06-Dec-17</a:t>
+              <a:t>07-Dec-17</a:t>
             </a:fld>
             <a:endParaRPr lang="en-US"/>
           </a:p>
@@ -4806,10 +5722,62 @@
       </p:sp>
       <p:sp>
         <p:nvSpPr>
-          <p:cNvPr id="6" name="TextBox 5">
+          <p:cNvPr id="8" name="Title 1">
             <a:extLst>
               <a:ext uri="{FF2B5EF4-FFF2-40B4-BE49-F238E27FC236}">
-                <a16:creationId xmlns:a16="http://schemas.microsoft.com/office/drawing/2014/main" id="{3617BBF4-6C44-4519-8B49-494E4927B7D5}"/>
+                <a16:creationId xmlns:a16="http://schemas.microsoft.com/office/drawing/2014/main" id="{A76C46B3-BBBD-4BC5-90F8-FEFE21626CD0}"/>
+              </a:ext>
+            </a:extLst>
+          </p:cNvPr>
+          <p:cNvSpPr txBox="1">
+            <a:spLocks/>
+          </p:cNvSpPr>
+          <p:nvPr/>
+        </p:nvSpPr>
+        <p:spPr>
+          <a:xfrm>
+            <a:off x="3427076" y="136525"/>
+            <a:ext cx="2289848" cy="868363"/>
+          </a:xfrm>
+          <a:prstGeom prst="rect">
+            <a:avLst/>
+          </a:prstGeom>
+        </p:spPr>
+        <p:txBody>
+          <a:bodyPr vert="horz" lIns="91440" tIns="45720" rIns="91440" bIns="45720" rtlCol="0" anchor="ctr">
+            <a:normAutofit/>
+          </a:bodyPr>
+          <a:lstStyle>
+            <a:lvl1pPr algn="ctr" defTabSz="457200" rtl="0" eaLnBrk="1" latinLnBrk="0" hangingPunct="1">
+              <a:spcBef>
+                <a:spcPct val="0"/>
+              </a:spcBef>
+              <a:buNone/>
+              <a:defRPr sz="3600" b="1" i="0" kern="1200">
+                <a:solidFill>
+                  <a:schemeClr val="tx1"/>
+                </a:solidFill>
+                <a:latin typeface="+mj-lt"/>
+                <a:ea typeface="+mj-ea"/>
+                <a:cs typeface="+mj-cs"/>
+              </a:defRPr>
+            </a:lvl1pPr>
+          </a:lstStyle>
+          <a:p>
+            <a:r>
+              <a:rPr lang="en-US"/>
+              <a:t>EDA</a:t>
+            </a:r>
+            <a:endParaRPr lang="en-US" dirty="0"/>
+          </a:p>
+        </p:txBody>
+      </p:sp>
+      <p:sp>
+        <p:nvSpPr>
+          <p:cNvPr id="10" name="TextBox 9">
+            <a:extLst>
+              <a:ext uri="{FF2B5EF4-FFF2-40B4-BE49-F238E27FC236}">
+                <a16:creationId xmlns:a16="http://schemas.microsoft.com/office/drawing/2014/main" id="{F0B76F8F-5482-4651-8864-7AFABA4D4217}"/>
               </a:ext>
             </a:extLst>
           </p:cNvPr>
@@ -4818,8 +5786,8 @@
         </p:nvSpPr>
         <p:spPr>
           <a:xfrm>
-            <a:off x="3412273" y="1695135"/>
-            <a:ext cx="5140712" cy="369332"/>
+            <a:off x="1361208" y="1456881"/>
+            <a:ext cx="6419385" cy="369332"/>
           </a:xfrm>
           <a:prstGeom prst="rect">
             <a:avLst/>
@@ -4832,6 +5800,7 @@
           </a:bodyPr>
           <a:lstStyle/>
           <a:p>
+            <a:pPr algn="ctr"/>
             <a:r>
               <a:rPr lang="en-US" dirty="0"/>
               <a:t>Genre Distribution</a:t>
@@ -4843,192 +5812,6 @@
     <p:extLst>
       <p:ext uri="{BB962C8B-B14F-4D97-AF65-F5344CB8AC3E}">
         <p14:creationId xmlns:p14="http://schemas.microsoft.com/office/powerpoint/2010/main" val="2590145118"/>
-      </p:ext>
-    </p:extLst>
-  </p:cSld>
-  <p:clrMapOvr>
-    <a:masterClrMapping/>
-  </p:clrMapOvr>
-</p:sld>
-</file>
-
-<file path=ppt/slides/slide8.xml><?xml version="1.0" encoding="utf-8"?>
-<p:sld xmlns:a="http://schemas.openxmlformats.org/drawingml/2006/main" xmlns:r="http://schemas.openxmlformats.org/officeDocument/2006/relationships" xmlns:p="http://schemas.openxmlformats.org/presentationml/2006/main">
-  <p:cSld>
-    <p:spTree>
-      <p:nvGrpSpPr>
-        <p:cNvPr id="1" name=""/>
-        <p:cNvGrpSpPr/>
-        <p:nvPr/>
-      </p:nvGrpSpPr>
-      <p:grpSpPr>
-        <a:xfrm>
-          <a:off x="0" y="0"/>
-          <a:ext cx="0" cy="0"/>
-          <a:chOff x="0" y="0"/>
-          <a:chExt cx="0" cy="0"/>
-        </a:xfrm>
-      </p:grpSpPr>
-      <p:sp>
-        <p:nvSpPr>
-          <p:cNvPr id="2" name="Title 1">
-            <a:extLst>
-              <a:ext uri="{FF2B5EF4-FFF2-40B4-BE49-F238E27FC236}">
-                <a16:creationId xmlns:a16="http://schemas.microsoft.com/office/drawing/2014/main" id="{D3CAA16F-C77B-4886-A8E9-1DD768A0F1FD}"/>
-              </a:ext>
-            </a:extLst>
-          </p:cNvPr>
-          <p:cNvSpPr>
-            <a:spLocks noGrp="1"/>
-          </p:cNvSpPr>
-          <p:nvPr>
-            <p:ph type="title"/>
-          </p:nvPr>
-        </p:nvSpPr>
-        <p:spPr>
-          <a:xfrm>
-            <a:off x="743285" y="1449340"/>
-            <a:ext cx="2289848" cy="868363"/>
-          </a:xfrm>
-        </p:spPr>
-        <p:txBody>
-          <a:bodyPr/>
-          <a:lstStyle/>
-          <a:p>
-            <a:r>
-              <a:rPr lang="en-US" dirty="0"/>
-              <a:t>EDA</a:t>
-            </a:r>
-          </a:p>
-        </p:txBody>
-      </p:sp>
-      <p:sp>
-        <p:nvSpPr>
-          <p:cNvPr id="4" name="Date Placeholder 3">
-            <a:extLst>
-              <a:ext uri="{FF2B5EF4-FFF2-40B4-BE49-F238E27FC236}">
-                <a16:creationId xmlns:a16="http://schemas.microsoft.com/office/drawing/2014/main" id="{A201EBB2-82CE-4D2A-893E-853398FB564A}"/>
-              </a:ext>
-            </a:extLst>
-          </p:cNvPr>
-          <p:cNvSpPr>
-            <a:spLocks noGrp="1"/>
-          </p:cNvSpPr>
-          <p:nvPr>
-            <p:ph type="dt" sz="half" idx="10"/>
-          </p:nvPr>
-        </p:nvSpPr>
-        <p:spPr/>
-        <p:txBody>
-          <a:bodyPr/>
-          <a:lstStyle/>
-          <a:p>
-            <a:fld id="{EA0B2E4C-09A0-1C47-AC04-653E7CA38318}" type="datetime1">
-              <a:rPr lang="en-US" smtClean="0"/>
-              <a:t>06-Dec-17</a:t>
-            </a:fld>
-            <a:endParaRPr lang="en-US"/>
-          </a:p>
-        </p:txBody>
-      </p:sp>
-      <p:sp>
-        <p:nvSpPr>
-          <p:cNvPr id="5" name="Footer Placeholder 4">
-            <a:extLst>
-              <a:ext uri="{FF2B5EF4-FFF2-40B4-BE49-F238E27FC236}">
-                <a16:creationId xmlns:a16="http://schemas.microsoft.com/office/drawing/2014/main" id="{4330116C-C09C-4855-8BE1-A63BAEB123F1}"/>
-              </a:ext>
-            </a:extLst>
-          </p:cNvPr>
-          <p:cNvSpPr>
-            <a:spLocks noGrp="1"/>
-          </p:cNvSpPr>
-          <p:nvPr>
-            <p:ph type="ftr" sz="quarter" idx="11"/>
-          </p:nvPr>
-        </p:nvSpPr>
-        <p:spPr/>
-        <p:txBody>
-          <a:bodyPr/>
-          <a:lstStyle/>
-          <a:p>
-            <a:r>
-              <a:rPr lang="pt-BR"/>
-              <a:t>Instituto Superior Técnico </a:t>
-            </a:r>
-            <a:endParaRPr lang="en-US"/>
-          </a:p>
-        </p:txBody>
-      </p:sp>
-      <p:sp>
-        <p:nvSpPr>
-          <p:cNvPr id="6" name="TextBox 5">
-            <a:extLst>
-              <a:ext uri="{FF2B5EF4-FFF2-40B4-BE49-F238E27FC236}">
-                <a16:creationId xmlns:a16="http://schemas.microsoft.com/office/drawing/2014/main" id="{3617BBF4-6C44-4519-8B49-494E4927B7D5}"/>
-              </a:ext>
-            </a:extLst>
-          </p:cNvPr>
-          <p:cNvSpPr txBox="1"/>
-          <p:nvPr/>
-        </p:nvSpPr>
-        <p:spPr>
-          <a:xfrm>
-            <a:off x="3412273" y="1695135"/>
-            <a:ext cx="5140712" cy="369332"/>
-          </a:xfrm>
-          <a:prstGeom prst="rect">
-            <a:avLst/>
-          </a:prstGeom>
-          <a:noFill/>
-        </p:spPr>
-        <p:txBody>
-          <a:bodyPr wrap="square" rtlCol="0">
-            <a:spAutoFit/>
-          </a:bodyPr>
-          <a:lstStyle/>
-          <a:p>
-            <a:r>
-              <a:rPr lang="en-US" dirty="0"/>
-              <a:t>Genre Distribution</a:t>
-            </a:r>
-          </a:p>
-        </p:txBody>
-      </p:sp>
-      <p:pic>
-        <p:nvPicPr>
-          <p:cNvPr id="7" name="Picture 6">
-            <a:extLst>
-              <a:ext uri="{FF2B5EF4-FFF2-40B4-BE49-F238E27FC236}">
-                <a16:creationId xmlns:a16="http://schemas.microsoft.com/office/drawing/2014/main" id="{8DDF69F9-F577-4A37-8B21-CCDFF18CD6AA}"/>
-              </a:ext>
-            </a:extLst>
-          </p:cNvPr>
-          <p:cNvPicPr>
-            <a:picLocks noChangeAspect="1"/>
-          </p:cNvPicPr>
-          <p:nvPr/>
-        </p:nvPicPr>
-        <p:blipFill>
-          <a:blip r:embed="rId2"/>
-          <a:stretch>
-            <a:fillRect/>
-          </a:stretch>
-        </p:blipFill>
-        <p:spPr>
-          <a:xfrm>
-            <a:off x="1326379" y="2133941"/>
-            <a:ext cx="6491242" cy="4280711"/>
-          </a:xfrm>
-          <a:prstGeom prst="rect">
-            <a:avLst/>
-          </a:prstGeom>
-        </p:spPr>
-      </p:pic>
-    </p:spTree>
-    <p:extLst>
-      <p:ext uri="{BB962C8B-B14F-4D97-AF65-F5344CB8AC3E}">
-        <p14:creationId xmlns:p14="http://schemas.microsoft.com/office/powerpoint/2010/main" val="2331167531"/>
       </p:ext>
     </p:extLst>
   </p:cSld>
@@ -5057,10 +5840,10 @@
       </p:grpSpPr>
       <p:sp>
         <p:nvSpPr>
-          <p:cNvPr id="2" name="Title 1">
+          <p:cNvPr id="4" name="Date Placeholder 3">
             <a:extLst>
               <a:ext uri="{FF2B5EF4-FFF2-40B4-BE49-F238E27FC236}">
-                <a16:creationId xmlns:a16="http://schemas.microsoft.com/office/drawing/2014/main" id="{EB2DE183-A5D1-446C-93CD-6FBBFD47C4A0}"/>
+                <a16:creationId xmlns:a16="http://schemas.microsoft.com/office/drawing/2014/main" id="{A201EBB2-82CE-4D2A-893E-853398FB564A}"/>
               </a:ext>
             </a:extLst>
           </p:cNvPr>
@@ -5068,7 +5851,7 @@
             <a:spLocks noGrp="1"/>
           </p:cNvSpPr>
           <p:nvPr>
-            <p:ph type="title"/>
+            <p:ph type="dt" sz="half" idx="10"/>
           </p:nvPr>
         </p:nvSpPr>
         <p:spPr/>
@@ -5076,19 +5859,20 @@
           <a:bodyPr/>
           <a:lstStyle/>
           <a:p>
-            <a:r>
-              <a:rPr lang="en-US" dirty="0"/>
-              <a:t>Platform Classification</a:t>
-            </a:r>
-          </a:p>
-        </p:txBody>
-      </p:sp>
-      <p:sp>
-        <p:nvSpPr>
-          <p:cNvPr id="3" name="Content Placeholder 2">
+            <a:fld id="{EA0B2E4C-09A0-1C47-AC04-653E7CA38318}" type="datetime1">
+              <a:rPr lang="en-US" smtClean="0"/>
+              <a:t>07-Dec-17</a:t>
+            </a:fld>
+            <a:endParaRPr lang="en-US"/>
+          </a:p>
+        </p:txBody>
+      </p:sp>
+      <p:sp>
+        <p:nvSpPr>
+          <p:cNvPr id="5" name="Footer Placeholder 4">
             <a:extLst>
               <a:ext uri="{FF2B5EF4-FFF2-40B4-BE49-F238E27FC236}">
-                <a16:creationId xmlns:a16="http://schemas.microsoft.com/office/drawing/2014/main" id="{53044590-031B-438E-ADCB-66CD6AD356F1}"/>
+                <a16:creationId xmlns:a16="http://schemas.microsoft.com/office/drawing/2014/main" id="{4330116C-C09C-4855-8BE1-A63BAEB123F1}"/>
               </a:ext>
             </a:extLst>
           </p:cNvPr>
@@ -5096,7 +5880,7 @@
             <a:spLocks noGrp="1"/>
           </p:cNvSpPr>
           <p:nvPr>
-            <p:ph idx="1"/>
+            <p:ph type="ftr" sz="quarter" idx="11"/>
           </p:nvPr>
         </p:nvSpPr>
         <p:spPr/>
@@ -5104,72 +5888,136 @@
           <a:bodyPr/>
           <a:lstStyle/>
           <a:p>
+            <a:r>
+              <a:rPr lang="pt-BR"/>
+              <a:t>Instituto Superior Técnico </a:t>
+            </a:r>
             <a:endParaRPr lang="en-US"/>
           </a:p>
         </p:txBody>
       </p:sp>
       <p:sp>
         <p:nvSpPr>
-          <p:cNvPr id="4" name="Date Placeholder 3">
+          <p:cNvPr id="6" name="TextBox 5">
             <a:extLst>
               <a:ext uri="{FF2B5EF4-FFF2-40B4-BE49-F238E27FC236}">
-                <a16:creationId xmlns:a16="http://schemas.microsoft.com/office/drawing/2014/main" id="{3A58F7D9-C22C-43D3-8E0A-70B15B0862B4}"/>
+                <a16:creationId xmlns:a16="http://schemas.microsoft.com/office/drawing/2014/main" id="{3617BBF4-6C44-4519-8B49-494E4927B7D5}"/>
               </a:ext>
             </a:extLst>
           </p:cNvPr>
-          <p:cNvSpPr>
-            <a:spLocks noGrp="1"/>
-          </p:cNvSpPr>
-          <p:nvPr>
-            <p:ph type="dt" sz="half" idx="10"/>
-          </p:nvPr>
-        </p:nvSpPr>
-        <p:spPr/>
-        <p:txBody>
-          <a:bodyPr/>
+          <p:cNvSpPr txBox="1"/>
+          <p:nvPr/>
+        </p:nvSpPr>
+        <p:spPr>
+          <a:xfrm>
+            <a:off x="2001644" y="1316435"/>
+            <a:ext cx="5140712" cy="369332"/>
+          </a:xfrm>
+          <a:prstGeom prst="rect">
+            <a:avLst/>
+          </a:prstGeom>
+          <a:noFill/>
+        </p:spPr>
+        <p:txBody>
+          <a:bodyPr wrap="square" rtlCol="0">
+            <a:spAutoFit/>
+          </a:bodyPr>
           <a:lstStyle/>
           <a:p>
-            <a:fld id="{EA0B2E4C-09A0-1C47-AC04-653E7CA38318}" type="datetime1">
-              <a:rPr lang="en-US" smtClean="0"/>
-              <a:t>06-Dec-17</a:t>
-            </a:fld>
-            <a:endParaRPr lang="en-US"/>
-          </a:p>
-        </p:txBody>
-      </p:sp>
-      <p:sp>
-        <p:nvSpPr>
-          <p:cNvPr id="5" name="Footer Placeholder 4">
+            <a:pPr algn="ctr"/>
+            <a:r>
+              <a:rPr lang="en-US" dirty="0"/>
+              <a:t>Genre Distribution</a:t>
+            </a:r>
+          </a:p>
+        </p:txBody>
+      </p:sp>
+      <p:pic>
+        <p:nvPicPr>
+          <p:cNvPr id="7" name="Picture 6">
             <a:extLst>
               <a:ext uri="{FF2B5EF4-FFF2-40B4-BE49-F238E27FC236}">
-                <a16:creationId xmlns:a16="http://schemas.microsoft.com/office/drawing/2014/main" id="{B034D441-E3FA-41BA-9C6B-52FE04166311}"/>
+                <a16:creationId xmlns:a16="http://schemas.microsoft.com/office/drawing/2014/main" id="{8DDF69F9-F577-4A37-8B21-CCDFF18CD6AA}"/>
               </a:ext>
             </a:extLst>
           </p:cNvPr>
-          <p:cNvSpPr>
-            <a:spLocks noGrp="1"/>
-          </p:cNvSpPr>
-          <p:nvPr>
-            <p:ph type="ftr" sz="quarter" idx="11"/>
-          </p:nvPr>
-        </p:nvSpPr>
-        <p:spPr/>
-        <p:txBody>
-          <a:bodyPr/>
-          <a:lstStyle/>
-          <a:p>
-            <a:r>
-              <a:rPr lang="pt-BR"/>
-              <a:t>Instituto Superior Técnico </a:t>
-            </a:r>
-            <a:endParaRPr lang="en-US"/>
+          <p:cNvPicPr>
+            <a:picLocks noChangeAspect="1"/>
+          </p:cNvPicPr>
+          <p:nvPr/>
+        </p:nvPicPr>
+        <p:blipFill>
+          <a:blip r:embed="rId2"/>
+          <a:stretch>
+            <a:fillRect/>
+          </a:stretch>
+        </p:blipFill>
+        <p:spPr>
+          <a:xfrm>
+            <a:off x="986575" y="1685767"/>
+            <a:ext cx="7170850" cy="4728885"/>
+          </a:xfrm>
+          <a:prstGeom prst="rect">
+            <a:avLst/>
+          </a:prstGeom>
+        </p:spPr>
+      </p:pic>
+      <p:sp>
+        <p:nvSpPr>
+          <p:cNvPr id="8" name="Title 1">
+            <a:extLst>
+              <a:ext uri="{FF2B5EF4-FFF2-40B4-BE49-F238E27FC236}">
+                <a16:creationId xmlns:a16="http://schemas.microsoft.com/office/drawing/2014/main" id="{9B24D585-7E5A-4190-BC81-A12F5A35281C}"/>
+              </a:ext>
+            </a:extLst>
+          </p:cNvPr>
+          <p:cNvSpPr txBox="1">
+            <a:spLocks/>
+          </p:cNvSpPr>
+          <p:nvPr/>
+        </p:nvSpPr>
+        <p:spPr>
+          <a:xfrm>
+            <a:off x="3427076" y="136525"/>
+            <a:ext cx="2289848" cy="868363"/>
+          </a:xfrm>
+          <a:prstGeom prst="rect">
+            <a:avLst/>
+          </a:prstGeom>
+        </p:spPr>
+        <p:txBody>
+          <a:bodyPr vert="horz" lIns="91440" tIns="45720" rIns="91440" bIns="45720" rtlCol="0" anchor="ctr">
+            <a:normAutofit/>
+          </a:bodyPr>
+          <a:lstStyle>
+            <a:lvl1pPr algn="ctr" defTabSz="457200" rtl="0" eaLnBrk="1" latinLnBrk="0" hangingPunct="1">
+              <a:spcBef>
+                <a:spcPct val="0"/>
+              </a:spcBef>
+              <a:buNone/>
+              <a:defRPr sz="3600" b="1" i="0" kern="1200">
+                <a:solidFill>
+                  <a:schemeClr val="tx1"/>
+                </a:solidFill>
+                <a:latin typeface="+mj-lt"/>
+                <a:ea typeface="+mj-ea"/>
+                <a:cs typeface="+mj-cs"/>
+              </a:defRPr>
+            </a:lvl1pPr>
+          </a:lstStyle>
+          <a:p>
+            <a:r>
+              <a:rPr lang="en-US"/>
+              <a:t>EDA</a:t>
+            </a:r>
+            <a:endParaRPr lang="en-US" dirty="0"/>
           </a:p>
         </p:txBody>
       </p:sp>
     </p:spTree>
     <p:extLst>
       <p:ext uri="{BB962C8B-B14F-4D97-AF65-F5344CB8AC3E}">
-        <p14:creationId xmlns:p14="http://schemas.microsoft.com/office/powerpoint/2010/main" val="585645261"/>
+        <p14:creationId xmlns:p14="http://schemas.microsoft.com/office/powerpoint/2010/main" val="2331167531"/>
       </p:ext>
     </p:extLst>
   </p:cSld>

</xml_diff>

<commit_message>
added confusion matrices to presentation
</commit_message>
<xml_diff>
--- a/dataMining.pptx
+++ b/dataMining.pptx
@@ -14,8 +14,14 @@
     <p:sldId id="264" r:id="rId8"/>
     <p:sldId id="263" r:id="rId9"/>
     <p:sldId id="265" r:id="rId10"/>
-    <p:sldId id="259" r:id="rId11"/>
-    <p:sldId id="260" r:id="rId12"/>
+    <p:sldId id="268" r:id="rId11"/>
+    <p:sldId id="269" r:id="rId12"/>
+    <p:sldId id="270" r:id="rId13"/>
+    <p:sldId id="271" r:id="rId14"/>
+    <p:sldId id="272" r:id="rId15"/>
+    <p:sldId id="273" r:id="rId16"/>
+    <p:sldId id="259" r:id="rId17"/>
+    <p:sldId id="260" r:id="rId18"/>
   </p:sldIdLst>
   <p:sldSz cx="9144000" cy="6858000" type="screen4x3"/>
   <p:notesSz cx="6858000" cy="9144000"/>
@@ -2766,7 +2772,12 @@
             <p:ph type="title"/>
           </p:nvPr>
         </p:nvSpPr>
-        <p:spPr/>
+        <p:spPr>
+          <a:xfrm>
+            <a:off x="1488763" y="136525"/>
+            <a:ext cx="7655237" cy="868363"/>
+          </a:xfrm>
+        </p:spPr>
         <p:txBody>
           <a:bodyPr/>
           <a:lstStyle/>
@@ -2778,6 +2789,879 @@
           </a:p>
         </p:txBody>
       </p:sp>
+      <p:sp>
+        <p:nvSpPr>
+          <p:cNvPr id="4" name="Date Placeholder 3">
+            <a:extLst>
+              <a:ext uri="{FF2B5EF4-FFF2-40B4-BE49-F238E27FC236}">
+                <a16:creationId xmlns:a16="http://schemas.microsoft.com/office/drawing/2014/main" id="{3A58F7D9-C22C-43D3-8E0A-70B15B0862B4}"/>
+              </a:ext>
+            </a:extLst>
+          </p:cNvPr>
+          <p:cNvSpPr>
+            <a:spLocks noGrp="1"/>
+          </p:cNvSpPr>
+          <p:nvPr>
+            <p:ph type="dt" sz="half" idx="10"/>
+          </p:nvPr>
+        </p:nvSpPr>
+        <p:spPr/>
+        <p:txBody>
+          <a:bodyPr/>
+          <a:lstStyle/>
+          <a:p>
+            <a:fld id="{EA0B2E4C-09A0-1C47-AC04-653E7CA38318}" type="datetime1">
+              <a:rPr lang="en-US" smtClean="0"/>
+              <a:t>07-Dec-17</a:t>
+            </a:fld>
+            <a:endParaRPr lang="en-US"/>
+          </a:p>
+        </p:txBody>
+      </p:sp>
+      <p:sp>
+        <p:nvSpPr>
+          <p:cNvPr id="5" name="Footer Placeholder 4">
+            <a:extLst>
+              <a:ext uri="{FF2B5EF4-FFF2-40B4-BE49-F238E27FC236}">
+                <a16:creationId xmlns:a16="http://schemas.microsoft.com/office/drawing/2014/main" id="{B034D441-E3FA-41BA-9C6B-52FE04166311}"/>
+              </a:ext>
+            </a:extLst>
+          </p:cNvPr>
+          <p:cNvSpPr>
+            <a:spLocks noGrp="1"/>
+          </p:cNvSpPr>
+          <p:nvPr>
+            <p:ph type="ftr" sz="quarter" idx="11"/>
+          </p:nvPr>
+        </p:nvSpPr>
+        <p:spPr/>
+        <p:txBody>
+          <a:bodyPr/>
+          <a:lstStyle/>
+          <a:p>
+            <a:r>
+              <a:rPr lang="pt-BR"/>
+              <a:t>Instituto Superior Técnico </a:t>
+            </a:r>
+            <a:endParaRPr lang="en-US"/>
+          </a:p>
+        </p:txBody>
+      </p:sp>
+      <p:pic>
+        <p:nvPicPr>
+          <p:cNvPr id="11" name="Picture 10">
+            <a:extLst>
+              <a:ext uri="{FF2B5EF4-FFF2-40B4-BE49-F238E27FC236}">
+                <a16:creationId xmlns:a16="http://schemas.microsoft.com/office/drawing/2014/main" id="{C6B0E118-1E48-474C-9070-D340390522FA}"/>
+              </a:ext>
+            </a:extLst>
+          </p:cNvPr>
+          <p:cNvPicPr>
+            <a:picLocks noChangeAspect="1"/>
+          </p:cNvPicPr>
+          <p:nvPr/>
+        </p:nvPicPr>
+        <p:blipFill>
+          <a:blip r:embed="rId2"/>
+          <a:stretch>
+            <a:fillRect/>
+          </a:stretch>
+        </p:blipFill>
+        <p:spPr>
+          <a:xfrm>
+            <a:off x="1604817" y="1204669"/>
+            <a:ext cx="5934366" cy="5209983"/>
+          </a:xfrm>
+          <a:prstGeom prst="rect">
+            <a:avLst/>
+          </a:prstGeom>
+        </p:spPr>
+      </p:pic>
+    </p:spTree>
+    <p:extLst>
+      <p:ext uri="{BB962C8B-B14F-4D97-AF65-F5344CB8AC3E}">
+        <p14:creationId xmlns:p14="http://schemas.microsoft.com/office/powerpoint/2010/main" val="1620373129"/>
+      </p:ext>
+    </p:extLst>
+  </p:cSld>
+  <p:clrMapOvr>
+    <a:masterClrMapping/>
+  </p:clrMapOvr>
+</p:sld>
+</file>
+
+<file path=ppt/slides/slide11.xml><?xml version="1.0" encoding="utf-8"?>
+<p:sld xmlns:a="http://schemas.openxmlformats.org/drawingml/2006/main" xmlns:r="http://schemas.openxmlformats.org/officeDocument/2006/relationships" xmlns:p="http://schemas.openxmlformats.org/presentationml/2006/main">
+  <p:cSld>
+    <p:spTree>
+      <p:nvGrpSpPr>
+        <p:cNvPr id="1" name=""/>
+        <p:cNvGrpSpPr/>
+        <p:nvPr/>
+      </p:nvGrpSpPr>
+      <p:grpSpPr>
+        <a:xfrm>
+          <a:off x="0" y="0"/>
+          <a:ext cx="0" cy="0"/>
+          <a:chOff x="0" y="0"/>
+          <a:chExt cx="0" cy="0"/>
+        </a:xfrm>
+      </p:grpSpPr>
+      <p:sp>
+        <p:nvSpPr>
+          <p:cNvPr id="2" name="Title 1">
+            <a:extLst>
+              <a:ext uri="{FF2B5EF4-FFF2-40B4-BE49-F238E27FC236}">
+                <a16:creationId xmlns:a16="http://schemas.microsoft.com/office/drawing/2014/main" id="{EB2DE183-A5D1-446C-93CD-6FBBFD47C4A0}"/>
+              </a:ext>
+            </a:extLst>
+          </p:cNvPr>
+          <p:cNvSpPr>
+            <a:spLocks noGrp="1"/>
+          </p:cNvSpPr>
+          <p:nvPr>
+            <p:ph type="title"/>
+          </p:nvPr>
+        </p:nvSpPr>
+        <p:spPr>
+          <a:xfrm>
+            <a:off x="1488763" y="136525"/>
+            <a:ext cx="7655237" cy="868363"/>
+          </a:xfrm>
+        </p:spPr>
+        <p:txBody>
+          <a:bodyPr/>
+          <a:lstStyle/>
+          <a:p>
+            <a:r>
+              <a:rPr lang="en-US" dirty="0"/>
+              <a:t>Platform Classification</a:t>
+            </a:r>
+          </a:p>
+        </p:txBody>
+      </p:sp>
+      <p:sp>
+        <p:nvSpPr>
+          <p:cNvPr id="4" name="Date Placeholder 3">
+            <a:extLst>
+              <a:ext uri="{FF2B5EF4-FFF2-40B4-BE49-F238E27FC236}">
+                <a16:creationId xmlns:a16="http://schemas.microsoft.com/office/drawing/2014/main" id="{3A58F7D9-C22C-43D3-8E0A-70B15B0862B4}"/>
+              </a:ext>
+            </a:extLst>
+          </p:cNvPr>
+          <p:cNvSpPr>
+            <a:spLocks noGrp="1"/>
+          </p:cNvSpPr>
+          <p:nvPr>
+            <p:ph type="dt" sz="half" idx="10"/>
+          </p:nvPr>
+        </p:nvSpPr>
+        <p:spPr/>
+        <p:txBody>
+          <a:bodyPr/>
+          <a:lstStyle/>
+          <a:p>
+            <a:fld id="{EA0B2E4C-09A0-1C47-AC04-653E7CA38318}" type="datetime1">
+              <a:rPr lang="en-US" smtClean="0"/>
+              <a:t>07-Dec-17</a:t>
+            </a:fld>
+            <a:endParaRPr lang="en-US"/>
+          </a:p>
+        </p:txBody>
+      </p:sp>
+      <p:sp>
+        <p:nvSpPr>
+          <p:cNvPr id="5" name="Footer Placeholder 4">
+            <a:extLst>
+              <a:ext uri="{FF2B5EF4-FFF2-40B4-BE49-F238E27FC236}">
+                <a16:creationId xmlns:a16="http://schemas.microsoft.com/office/drawing/2014/main" id="{B034D441-E3FA-41BA-9C6B-52FE04166311}"/>
+              </a:ext>
+            </a:extLst>
+          </p:cNvPr>
+          <p:cNvSpPr>
+            <a:spLocks noGrp="1"/>
+          </p:cNvSpPr>
+          <p:nvPr>
+            <p:ph type="ftr" sz="quarter" idx="11"/>
+          </p:nvPr>
+        </p:nvSpPr>
+        <p:spPr/>
+        <p:txBody>
+          <a:bodyPr/>
+          <a:lstStyle/>
+          <a:p>
+            <a:r>
+              <a:rPr lang="pt-BR"/>
+              <a:t>Instituto Superior Técnico </a:t>
+            </a:r>
+            <a:endParaRPr lang="en-US"/>
+          </a:p>
+        </p:txBody>
+      </p:sp>
+      <p:pic>
+        <p:nvPicPr>
+          <p:cNvPr id="3" name="Picture 2">
+            <a:extLst>
+              <a:ext uri="{FF2B5EF4-FFF2-40B4-BE49-F238E27FC236}">
+                <a16:creationId xmlns:a16="http://schemas.microsoft.com/office/drawing/2014/main" id="{02E1B02A-8DEB-4696-B0C6-637DFA5ABBA2}"/>
+              </a:ext>
+            </a:extLst>
+          </p:cNvPr>
+          <p:cNvPicPr>
+            <a:picLocks noChangeAspect="1"/>
+          </p:cNvPicPr>
+          <p:nvPr/>
+        </p:nvPicPr>
+        <p:blipFill>
+          <a:blip r:embed="rId2"/>
+          <a:stretch>
+            <a:fillRect/>
+          </a:stretch>
+        </p:blipFill>
+        <p:spPr>
+          <a:xfrm>
+            <a:off x="1652613" y="1204668"/>
+            <a:ext cx="5838774" cy="5209983"/>
+          </a:xfrm>
+          <a:prstGeom prst="rect">
+            <a:avLst/>
+          </a:prstGeom>
+        </p:spPr>
+      </p:pic>
+    </p:spTree>
+    <p:extLst>
+      <p:ext uri="{BB962C8B-B14F-4D97-AF65-F5344CB8AC3E}">
+        <p14:creationId xmlns:p14="http://schemas.microsoft.com/office/powerpoint/2010/main" val="1955315890"/>
+      </p:ext>
+    </p:extLst>
+  </p:cSld>
+  <p:clrMapOvr>
+    <a:masterClrMapping/>
+  </p:clrMapOvr>
+</p:sld>
+</file>
+
+<file path=ppt/slides/slide12.xml><?xml version="1.0" encoding="utf-8"?>
+<p:sld xmlns:a="http://schemas.openxmlformats.org/drawingml/2006/main" xmlns:r="http://schemas.openxmlformats.org/officeDocument/2006/relationships" xmlns:p="http://schemas.openxmlformats.org/presentationml/2006/main">
+  <p:cSld>
+    <p:spTree>
+      <p:nvGrpSpPr>
+        <p:cNvPr id="1" name=""/>
+        <p:cNvGrpSpPr/>
+        <p:nvPr/>
+      </p:nvGrpSpPr>
+      <p:grpSpPr>
+        <a:xfrm>
+          <a:off x="0" y="0"/>
+          <a:ext cx="0" cy="0"/>
+          <a:chOff x="0" y="0"/>
+          <a:chExt cx="0" cy="0"/>
+        </a:xfrm>
+      </p:grpSpPr>
+      <p:sp>
+        <p:nvSpPr>
+          <p:cNvPr id="2" name="Title 1">
+            <a:extLst>
+              <a:ext uri="{FF2B5EF4-FFF2-40B4-BE49-F238E27FC236}">
+                <a16:creationId xmlns:a16="http://schemas.microsoft.com/office/drawing/2014/main" id="{EB2DE183-A5D1-446C-93CD-6FBBFD47C4A0}"/>
+              </a:ext>
+            </a:extLst>
+          </p:cNvPr>
+          <p:cNvSpPr>
+            <a:spLocks noGrp="1"/>
+          </p:cNvSpPr>
+          <p:nvPr>
+            <p:ph type="title"/>
+          </p:nvPr>
+        </p:nvSpPr>
+        <p:spPr>
+          <a:xfrm>
+            <a:off x="1488763" y="136525"/>
+            <a:ext cx="7655237" cy="868363"/>
+          </a:xfrm>
+        </p:spPr>
+        <p:txBody>
+          <a:bodyPr/>
+          <a:lstStyle/>
+          <a:p>
+            <a:r>
+              <a:rPr lang="en-US" dirty="0"/>
+              <a:t>Platform Classification</a:t>
+            </a:r>
+          </a:p>
+        </p:txBody>
+      </p:sp>
+      <p:sp>
+        <p:nvSpPr>
+          <p:cNvPr id="4" name="Date Placeholder 3">
+            <a:extLst>
+              <a:ext uri="{FF2B5EF4-FFF2-40B4-BE49-F238E27FC236}">
+                <a16:creationId xmlns:a16="http://schemas.microsoft.com/office/drawing/2014/main" id="{3A58F7D9-C22C-43D3-8E0A-70B15B0862B4}"/>
+              </a:ext>
+            </a:extLst>
+          </p:cNvPr>
+          <p:cNvSpPr>
+            <a:spLocks noGrp="1"/>
+          </p:cNvSpPr>
+          <p:nvPr>
+            <p:ph type="dt" sz="half" idx="10"/>
+          </p:nvPr>
+        </p:nvSpPr>
+        <p:spPr/>
+        <p:txBody>
+          <a:bodyPr/>
+          <a:lstStyle/>
+          <a:p>
+            <a:fld id="{EA0B2E4C-09A0-1C47-AC04-653E7CA38318}" type="datetime1">
+              <a:rPr lang="en-US" smtClean="0"/>
+              <a:t>07-Dec-17</a:t>
+            </a:fld>
+            <a:endParaRPr lang="en-US"/>
+          </a:p>
+        </p:txBody>
+      </p:sp>
+      <p:sp>
+        <p:nvSpPr>
+          <p:cNvPr id="5" name="Footer Placeholder 4">
+            <a:extLst>
+              <a:ext uri="{FF2B5EF4-FFF2-40B4-BE49-F238E27FC236}">
+                <a16:creationId xmlns:a16="http://schemas.microsoft.com/office/drawing/2014/main" id="{B034D441-E3FA-41BA-9C6B-52FE04166311}"/>
+              </a:ext>
+            </a:extLst>
+          </p:cNvPr>
+          <p:cNvSpPr>
+            <a:spLocks noGrp="1"/>
+          </p:cNvSpPr>
+          <p:nvPr>
+            <p:ph type="ftr" sz="quarter" idx="11"/>
+          </p:nvPr>
+        </p:nvSpPr>
+        <p:spPr/>
+        <p:txBody>
+          <a:bodyPr/>
+          <a:lstStyle/>
+          <a:p>
+            <a:r>
+              <a:rPr lang="pt-BR"/>
+              <a:t>Instituto Superior Técnico </a:t>
+            </a:r>
+            <a:endParaRPr lang="en-US"/>
+          </a:p>
+        </p:txBody>
+      </p:sp>
+      <p:pic>
+        <p:nvPicPr>
+          <p:cNvPr id="6" name="Picture 5">
+            <a:extLst>
+              <a:ext uri="{FF2B5EF4-FFF2-40B4-BE49-F238E27FC236}">
+                <a16:creationId xmlns:a16="http://schemas.microsoft.com/office/drawing/2014/main" id="{06BF1915-50EC-4AA8-8D30-39BC405C9478}"/>
+              </a:ext>
+            </a:extLst>
+          </p:cNvPr>
+          <p:cNvPicPr>
+            <a:picLocks noChangeAspect="1"/>
+          </p:cNvPicPr>
+          <p:nvPr/>
+        </p:nvPicPr>
+        <p:blipFill>
+          <a:blip r:embed="rId2"/>
+          <a:stretch>
+            <a:fillRect/>
+          </a:stretch>
+        </p:blipFill>
+        <p:spPr>
+          <a:xfrm>
+            <a:off x="1658704" y="1204668"/>
+            <a:ext cx="5826591" cy="5209983"/>
+          </a:xfrm>
+          <a:prstGeom prst="rect">
+            <a:avLst/>
+          </a:prstGeom>
+        </p:spPr>
+      </p:pic>
+    </p:spTree>
+    <p:extLst>
+      <p:ext uri="{BB962C8B-B14F-4D97-AF65-F5344CB8AC3E}">
+        <p14:creationId xmlns:p14="http://schemas.microsoft.com/office/powerpoint/2010/main" val="379899957"/>
+      </p:ext>
+    </p:extLst>
+  </p:cSld>
+  <p:clrMapOvr>
+    <a:masterClrMapping/>
+  </p:clrMapOvr>
+</p:sld>
+</file>
+
+<file path=ppt/slides/slide13.xml><?xml version="1.0" encoding="utf-8"?>
+<p:sld xmlns:a="http://schemas.openxmlformats.org/drawingml/2006/main" xmlns:r="http://schemas.openxmlformats.org/officeDocument/2006/relationships" xmlns:p="http://schemas.openxmlformats.org/presentationml/2006/main">
+  <p:cSld>
+    <p:spTree>
+      <p:nvGrpSpPr>
+        <p:cNvPr id="1" name=""/>
+        <p:cNvGrpSpPr/>
+        <p:nvPr/>
+      </p:nvGrpSpPr>
+      <p:grpSpPr>
+        <a:xfrm>
+          <a:off x="0" y="0"/>
+          <a:ext cx="0" cy="0"/>
+          <a:chOff x="0" y="0"/>
+          <a:chExt cx="0" cy="0"/>
+        </a:xfrm>
+      </p:grpSpPr>
+      <p:sp>
+        <p:nvSpPr>
+          <p:cNvPr id="2" name="Title 1">
+            <a:extLst>
+              <a:ext uri="{FF2B5EF4-FFF2-40B4-BE49-F238E27FC236}">
+                <a16:creationId xmlns:a16="http://schemas.microsoft.com/office/drawing/2014/main" id="{EB2DE183-A5D1-446C-93CD-6FBBFD47C4A0}"/>
+              </a:ext>
+            </a:extLst>
+          </p:cNvPr>
+          <p:cNvSpPr>
+            <a:spLocks noGrp="1"/>
+          </p:cNvSpPr>
+          <p:nvPr>
+            <p:ph type="title"/>
+          </p:nvPr>
+        </p:nvSpPr>
+        <p:spPr>
+          <a:xfrm>
+            <a:off x="1488763" y="136525"/>
+            <a:ext cx="7655237" cy="868363"/>
+          </a:xfrm>
+        </p:spPr>
+        <p:txBody>
+          <a:bodyPr/>
+          <a:lstStyle/>
+          <a:p>
+            <a:r>
+              <a:rPr lang="en-US" dirty="0"/>
+              <a:t>Platform Classification</a:t>
+            </a:r>
+          </a:p>
+        </p:txBody>
+      </p:sp>
+      <p:sp>
+        <p:nvSpPr>
+          <p:cNvPr id="4" name="Date Placeholder 3">
+            <a:extLst>
+              <a:ext uri="{FF2B5EF4-FFF2-40B4-BE49-F238E27FC236}">
+                <a16:creationId xmlns:a16="http://schemas.microsoft.com/office/drawing/2014/main" id="{3A58F7D9-C22C-43D3-8E0A-70B15B0862B4}"/>
+              </a:ext>
+            </a:extLst>
+          </p:cNvPr>
+          <p:cNvSpPr>
+            <a:spLocks noGrp="1"/>
+          </p:cNvSpPr>
+          <p:nvPr>
+            <p:ph type="dt" sz="half" idx="10"/>
+          </p:nvPr>
+        </p:nvSpPr>
+        <p:spPr/>
+        <p:txBody>
+          <a:bodyPr/>
+          <a:lstStyle/>
+          <a:p>
+            <a:fld id="{EA0B2E4C-09A0-1C47-AC04-653E7CA38318}" type="datetime1">
+              <a:rPr lang="en-US" smtClean="0"/>
+              <a:t>07-Dec-17</a:t>
+            </a:fld>
+            <a:endParaRPr lang="en-US"/>
+          </a:p>
+        </p:txBody>
+      </p:sp>
+      <p:sp>
+        <p:nvSpPr>
+          <p:cNvPr id="5" name="Footer Placeholder 4">
+            <a:extLst>
+              <a:ext uri="{FF2B5EF4-FFF2-40B4-BE49-F238E27FC236}">
+                <a16:creationId xmlns:a16="http://schemas.microsoft.com/office/drawing/2014/main" id="{B034D441-E3FA-41BA-9C6B-52FE04166311}"/>
+              </a:ext>
+            </a:extLst>
+          </p:cNvPr>
+          <p:cNvSpPr>
+            <a:spLocks noGrp="1"/>
+          </p:cNvSpPr>
+          <p:nvPr>
+            <p:ph type="ftr" sz="quarter" idx="11"/>
+          </p:nvPr>
+        </p:nvSpPr>
+        <p:spPr/>
+        <p:txBody>
+          <a:bodyPr/>
+          <a:lstStyle/>
+          <a:p>
+            <a:r>
+              <a:rPr lang="pt-BR"/>
+              <a:t>Instituto Superior Técnico </a:t>
+            </a:r>
+            <a:endParaRPr lang="en-US"/>
+          </a:p>
+        </p:txBody>
+      </p:sp>
+      <p:pic>
+        <p:nvPicPr>
+          <p:cNvPr id="3" name="Picture 2">
+            <a:extLst>
+              <a:ext uri="{FF2B5EF4-FFF2-40B4-BE49-F238E27FC236}">
+                <a16:creationId xmlns:a16="http://schemas.microsoft.com/office/drawing/2014/main" id="{A32EA339-4C74-4EE7-96A1-CFE8E7778101}"/>
+              </a:ext>
+            </a:extLst>
+          </p:cNvPr>
+          <p:cNvPicPr>
+            <a:picLocks noChangeAspect="1"/>
+          </p:cNvPicPr>
+          <p:nvPr/>
+        </p:nvPicPr>
+        <p:blipFill>
+          <a:blip r:embed="rId2"/>
+          <a:stretch>
+            <a:fillRect/>
+          </a:stretch>
+        </p:blipFill>
+        <p:spPr>
+          <a:xfrm>
+            <a:off x="1640079" y="1204668"/>
+            <a:ext cx="5863841" cy="5209984"/>
+          </a:xfrm>
+          <a:prstGeom prst="rect">
+            <a:avLst/>
+          </a:prstGeom>
+        </p:spPr>
+      </p:pic>
+    </p:spTree>
+    <p:extLst>
+      <p:ext uri="{BB962C8B-B14F-4D97-AF65-F5344CB8AC3E}">
+        <p14:creationId xmlns:p14="http://schemas.microsoft.com/office/powerpoint/2010/main" val="1417546068"/>
+      </p:ext>
+    </p:extLst>
+  </p:cSld>
+  <p:clrMapOvr>
+    <a:masterClrMapping/>
+  </p:clrMapOvr>
+</p:sld>
+</file>
+
+<file path=ppt/slides/slide14.xml><?xml version="1.0" encoding="utf-8"?>
+<p:sld xmlns:a="http://schemas.openxmlformats.org/drawingml/2006/main" xmlns:r="http://schemas.openxmlformats.org/officeDocument/2006/relationships" xmlns:p="http://schemas.openxmlformats.org/presentationml/2006/main">
+  <p:cSld>
+    <p:spTree>
+      <p:nvGrpSpPr>
+        <p:cNvPr id="1" name=""/>
+        <p:cNvGrpSpPr/>
+        <p:nvPr/>
+      </p:nvGrpSpPr>
+      <p:grpSpPr>
+        <a:xfrm>
+          <a:off x="0" y="0"/>
+          <a:ext cx="0" cy="0"/>
+          <a:chOff x="0" y="0"/>
+          <a:chExt cx="0" cy="0"/>
+        </a:xfrm>
+      </p:grpSpPr>
+      <p:sp>
+        <p:nvSpPr>
+          <p:cNvPr id="2" name="Title 1">
+            <a:extLst>
+              <a:ext uri="{FF2B5EF4-FFF2-40B4-BE49-F238E27FC236}">
+                <a16:creationId xmlns:a16="http://schemas.microsoft.com/office/drawing/2014/main" id="{EB2DE183-A5D1-446C-93CD-6FBBFD47C4A0}"/>
+              </a:ext>
+            </a:extLst>
+          </p:cNvPr>
+          <p:cNvSpPr>
+            <a:spLocks noGrp="1"/>
+          </p:cNvSpPr>
+          <p:nvPr>
+            <p:ph type="title"/>
+          </p:nvPr>
+        </p:nvSpPr>
+        <p:spPr>
+          <a:xfrm>
+            <a:off x="1488763" y="136525"/>
+            <a:ext cx="7655237" cy="868363"/>
+          </a:xfrm>
+        </p:spPr>
+        <p:txBody>
+          <a:bodyPr/>
+          <a:lstStyle/>
+          <a:p>
+            <a:r>
+              <a:rPr lang="en-US" dirty="0"/>
+              <a:t>Platform Classification</a:t>
+            </a:r>
+          </a:p>
+        </p:txBody>
+      </p:sp>
+      <p:sp>
+        <p:nvSpPr>
+          <p:cNvPr id="4" name="Date Placeholder 3">
+            <a:extLst>
+              <a:ext uri="{FF2B5EF4-FFF2-40B4-BE49-F238E27FC236}">
+                <a16:creationId xmlns:a16="http://schemas.microsoft.com/office/drawing/2014/main" id="{3A58F7D9-C22C-43D3-8E0A-70B15B0862B4}"/>
+              </a:ext>
+            </a:extLst>
+          </p:cNvPr>
+          <p:cNvSpPr>
+            <a:spLocks noGrp="1"/>
+          </p:cNvSpPr>
+          <p:nvPr>
+            <p:ph type="dt" sz="half" idx="10"/>
+          </p:nvPr>
+        </p:nvSpPr>
+        <p:spPr/>
+        <p:txBody>
+          <a:bodyPr/>
+          <a:lstStyle/>
+          <a:p>
+            <a:fld id="{EA0B2E4C-09A0-1C47-AC04-653E7CA38318}" type="datetime1">
+              <a:rPr lang="en-US" smtClean="0"/>
+              <a:t>07-Dec-17</a:t>
+            </a:fld>
+            <a:endParaRPr lang="en-US"/>
+          </a:p>
+        </p:txBody>
+      </p:sp>
+      <p:sp>
+        <p:nvSpPr>
+          <p:cNvPr id="5" name="Footer Placeholder 4">
+            <a:extLst>
+              <a:ext uri="{FF2B5EF4-FFF2-40B4-BE49-F238E27FC236}">
+                <a16:creationId xmlns:a16="http://schemas.microsoft.com/office/drawing/2014/main" id="{B034D441-E3FA-41BA-9C6B-52FE04166311}"/>
+              </a:ext>
+            </a:extLst>
+          </p:cNvPr>
+          <p:cNvSpPr>
+            <a:spLocks noGrp="1"/>
+          </p:cNvSpPr>
+          <p:nvPr>
+            <p:ph type="ftr" sz="quarter" idx="11"/>
+          </p:nvPr>
+        </p:nvSpPr>
+        <p:spPr/>
+        <p:txBody>
+          <a:bodyPr/>
+          <a:lstStyle/>
+          <a:p>
+            <a:r>
+              <a:rPr lang="pt-BR"/>
+              <a:t>Instituto Superior Técnico </a:t>
+            </a:r>
+            <a:endParaRPr lang="en-US"/>
+          </a:p>
+        </p:txBody>
+      </p:sp>
+      <p:pic>
+        <p:nvPicPr>
+          <p:cNvPr id="6" name="Picture 5">
+            <a:extLst>
+              <a:ext uri="{FF2B5EF4-FFF2-40B4-BE49-F238E27FC236}">
+                <a16:creationId xmlns:a16="http://schemas.microsoft.com/office/drawing/2014/main" id="{5F69EA81-0A2D-407E-8C74-B4B8A4657D28}"/>
+              </a:ext>
+            </a:extLst>
+          </p:cNvPr>
+          <p:cNvPicPr>
+            <a:picLocks noChangeAspect="1"/>
+          </p:cNvPicPr>
+          <p:nvPr/>
+        </p:nvPicPr>
+        <p:blipFill>
+          <a:blip r:embed="rId2"/>
+          <a:stretch>
+            <a:fillRect/>
+          </a:stretch>
+        </p:blipFill>
+        <p:spPr>
+          <a:xfrm>
+            <a:off x="1640696" y="1195754"/>
+            <a:ext cx="5862608" cy="5218898"/>
+          </a:xfrm>
+          <a:prstGeom prst="rect">
+            <a:avLst/>
+          </a:prstGeom>
+        </p:spPr>
+      </p:pic>
+    </p:spTree>
+    <p:extLst>
+      <p:ext uri="{BB962C8B-B14F-4D97-AF65-F5344CB8AC3E}">
+        <p14:creationId xmlns:p14="http://schemas.microsoft.com/office/powerpoint/2010/main" val="2191519526"/>
+      </p:ext>
+    </p:extLst>
+  </p:cSld>
+  <p:clrMapOvr>
+    <a:masterClrMapping/>
+  </p:clrMapOvr>
+</p:sld>
+</file>
+
+<file path=ppt/slides/slide15.xml><?xml version="1.0" encoding="utf-8"?>
+<p:sld xmlns:a="http://schemas.openxmlformats.org/drawingml/2006/main" xmlns:r="http://schemas.openxmlformats.org/officeDocument/2006/relationships" xmlns:p="http://schemas.openxmlformats.org/presentationml/2006/main">
+  <p:cSld>
+    <p:spTree>
+      <p:nvGrpSpPr>
+        <p:cNvPr id="1" name=""/>
+        <p:cNvGrpSpPr/>
+        <p:nvPr/>
+      </p:nvGrpSpPr>
+      <p:grpSpPr>
+        <a:xfrm>
+          <a:off x="0" y="0"/>
+          <a:ext cx="0" cy="0"/>
+          <a:chOff x="0" y="0"/>
+          <a:chExt cx="0" cy="0"/>
+        </a:xfrm>
+      </p:grpSpPr>
+      <p:sp>
+        <p:nvSpPr>
+          <p:cNvPr id="2" name="Title 1">
+            <a:extLst>
+              <a:ext uri="{FF2B5EF4-FFF2-40B4-BE49-F238E27FC236}">
+                <a16:creationId xmlns:a16="http://schemas.microsoft.com/office/drawing/2014/main" id="{EB2DE183-A5D1-446C-93CD-6FBBFD47C4A0}"/>
+              </a:ext>
+            </a:extLst>
+          </p:cNvPr>
+          <p:cNvSpPr>
+            <a:spLocks noGrp="1"/>
+          </p:cNvSpPr>
+          <p:nvPr>
+            <p:ph type="title"/>
+          </p:nvPr>
+        </p:nvSpPr>
+        <p:spPr>
+          <a:xfrm>
+            <a:off x="1488763" y="136525"/>
+            <a:ext cx="7655237" cy="868363"/>
+          </a:xfrm>
+        </p:spPr>
+        <p:txBody>
+          <a:bodyPr/>
+          <a:lstStyle/>
+          <a:p>
+            <a:r>
+              <a:rPr lang="en-US" dirty="0"/>
+              <a:t>Platform Classification</a:t>
+            </a:r>
+          </a:p>
+        </p:txBody>
+      </p:sp>
+      <p:sp>
+        <p:nvSpPr>
+          <p:cNvPr id="4" name="Date Placeholder 3">
+            <a:extLst>
+              <a:ext uri="{FF2B5EF4-FFF2-40B4-BE49-F238E27FC236}">
+                <a16:creationId xmlns:a16="http://schemas.microsoft.com/office/drawing/2014/main" id="{3A58F7D9-C22C-43D3-8E0A-70B15B0862B4}"/>
+              </a:ext>
+            </a:extLst>
+          </p:cNvPr>
+          <p:cNvSpPr>
+            <a:spLocks noGrp="1"/>
+          </p:cNvSpPr>
+          <p:nvPr>
+            <p:ph type="dt" sz="half" idx="10"/>
+          </p:nvPr>
+        </p:nvSpPr>
+        <p:spPr/>
+        <p:txBody>
+          <a:bodyPr/>
+          <a:lstStyle/>
+          <a:p>
+            <a:fld id="{EA0B2E4C-09A0-1C47-AC04-653E7CA38318}" type="datetime1">
+              <a:rPr lang="en-US" smtClean="0"/>
+              <a:t>07-Dec-17</a:t>
+            </a:fld>
+            <a:endParaRPr lang="en-US"/>
+          </a:p>
+        </p:txBody>
+      </p:sp>
+      <p:sp>
+        <p:nvSpPr>
+          <p:cNvPr id="5" name="Footer Placeholder 4">
+            <a:extLst>
+              <a:ext uri="{FF2B5EF4-FFF2-40B4-BE49-F238E27FC236}">
+                <a16:creationId xmlns:a16="http://schemas.microsoft.com/office/drawing/2014/main" id="{B034D441-E3FA-41BA-9C6B-52FE04166311}"/>
+              </a:ext>
+            </a:extLst>
+          </p:cNvPr>
+          <p:cNvSpPr>
+            <a:spLocks noGrp="1"/>
+          </p:cNvSpPr>
+          <p:nvPr>
+            <p:ph type="ftr" sz="quarter" idx="11"/>
+          </p:nvPr>
+        </p:nvSpPr>
+        <p:spPr/>
+        <p:txBody>
+          <a:bodyPr/>
+          <a:lstStyle/>
+          <a:p>
+            <a:r>
+              <a:rPr lang="pt-BR"/>
+              <a:t>Instituto Superior Técnico </a:t>
+            </a:r>
+            <a:endParaRPr lang="en-US"/>
+          </a:p>
+        </p:txBody>
+      </p:sp>
+      <p:pic>
+        <p:nvPicPr>
+          <p:cNvPr id="3" name="Picture 2">
+            <a:extLst>
+              <a:ext uri="{FF2B5EF4-FFF2-40B4-BE49-F238E27FC236}">
+                <a16:creationId xmlns:a16="http://schemas.microsoft.com/office/drawing/2014/main" id="{36D5F8C5-E24F-4CD4-8EBD-25A7124A09EE}"/>
+              </a:ext>
+            </a:extLst>
+          </p:cNvPr>
+          <p:cNvPicPr>
+            <a:picLocks noChangeAspect="1"/>
+          </p:cNvPicPr>
+          <p:nvPr/>
+        </p:nvPicPr>
+        <p:blipFill>
+          <a:blip r:embed="rId2"/>
+          <a:stretch>
+            <a:fillRect/>
+          </a:stretch>
+        </p:blipFill>
+        <p:spPr>
+          <a:xfrm>
+            <a:off x="1653869" y="1199269"/>
+            <a:ext cx="5836262" cy="5215383"/>
+          </a:xfrm>
+          <a:prstGeom prst="rect">
+            <a:avLst/>
+          </a:prstGeom>
+        </p:spPr>
+      </p:pic>
+    </p:spTree>
+    <p:extLst>
+      <p:ext uri="{BB962C8B-B14F-4D97-AF65-F5344CB8AC3E}">
+        <p14:creationId xmlns:p14="http://schemas.microsoft.com/office/powerpoint/2010/main" val="2367898534"/>
+      </p:ext>
+    </p:extLst>
+  </p:cSld>
+  <p:clrMapOvr>
+    <a:masterClrMapping/>
+  </p:clrMapOvr>
+</p:sld>
+</file>
+
+<file path=ppt/slides/slide16.xml><?xml version="1.0" encoding="utf-8"?>
+<p:sld xmlns:a="http://schemas.openxmlformats.org/drawingml/2006/main" xmlns:r="http://schemas.openxmlformats.org/officeDocument/2006/relationships" xmlns:p="http://schemas.openxmlformats.org/presentationml/2006/main">
+  <p:cSld>
+    <p:spTree>
+      <p:nvGrpSpPr>
+        <p:cNvPr id="1" name=""/>
+        <p:cNvGrpSpPr/>
+        <p:nvPr/>
+      </p:nvGrpSpPr>
+      <p:grpSpPr>
+        <a:xfrm>
+          <a:off x="0" y="0"/>
+          <a:ext cx="0" cy="0"/>
+          <a:chOff x="0" y="0"/>
+          <a:chExt cx="0" cy="0"/>
+        </a:xfrm>
+      </p:grpSpPr>
       <p:graphicFrame>
         <p:nvGraphicFramePr>
           <p:cNvPr id="6" name="Content Placeholder 5">
@@ -3463,6 +4347,39 @@
           </a:p>
         </p:txBody>
       </p:sp>
+      <p:sp>
+        <p:nvSpPr>
+          <p:cNvPr id="8" name="Title 1">
+            <a:extLst>
+              <a:ext uri="{FF2B5EF4-FFF2-40B4-BE49-F238E27FC236}">
+                <a16:creationId xmlns:a16="http://schemas.microsoft.com/office/drawing/2014/main" id="{5BDF42AC-3478-4B71-8F85-373B2DCA8A92}"/>
+              </a:ext>
+            </a:extLst>
+          </p:cNvPr>
+          <p:cNvSpPr>
+            <a:spLocks noGrp="1"/>
+          </p:cNvSpPr>
+          <p:nvPr>
+            <p:ph type="title"/>
+          </p:nvPr>
+        </p:nvSpPr>
+        <p:spPr>
+          <a:xfrm>
+            <a:off x="1488763" y="136525"/>
+            <a:ext cx="7655237" cy="868363"/>
+          </a:xfrm>
+        </p:spPr>
+        <p:txBody>
+          <a:bodyPr/>
+          <a:lstStyle/>
+          <a:p>
+            <a:r>
+              <a:rPr lang="en-US" dirty="0"/>
+              <a:t>Platform Classification</a:t>
+            </a:r>
+          </a:p>
+        </p:txBody>
+      </p:sp>
     </p:spTree>
     <p:extLst>
       <p:ext uri="{BB962C8B-B14F-4D97-AF65-F5344CB8AC3E}">
@@ -3476,7 +4393,7 @@
 </p:sld>
 </file>
 
-<file path=ppt/slides/slide11.xml><?xml version="1.0" encoding="utf-8"?>
+<file path=ppt/slides/slide17.xml><?xml version="1.0" encoding="utf-8"?>
 <p:sld xmlns:a="http://schemas.openxmlformats.org/drawingml/2006/main" xmlns:r="http://schemas.openxmlformats.org/officeDocument/2006/relationships" xmlns:p="http://schemas.openxmlformats.org/presentationml/2006/main">
   <p:cSld>
     <p:spTree>

</xml_diff>